<commit_message>
präsentation aufgeräumt ( ein wenig)
</commit_message>
<xml_diff>
--- a/Meilenstein 1/Präsentation/Präsentation MS1.pptx
+++ b/Meilenstein 1/Präsentation/Präsentation MS1.pptx
@@ -6110,7 +6110,7 @@
         <p:spPr>
           <a:xfrm>
             <a:off x="1389419" y="1043804"/>
-            <a:ext cx="8922379" cy="3970318"/>
+            <a:ext cx="2422779" cy="2431435"/>
           </a:xfrm>
           <a:prstGeom prst="rect">
             <a:avLst/>
@@ -6132,33 +6132,18 @@
             <a:endParaRPr lang="de-DE" sz="3600" dirty="0"/>
           </a:p>
           <a:p>
-            <a:endParaRPr lang="de-DE" sz="3600" dirty="0"/>
+            <a:endParaRPr lang="de-DE" sz="2800" dirty="0"/>
+          </a:p>
+          <a:p>
+            <a:r>
+              <a:rPr lang="de-DE" sz="2800" dirty="0"/>
+              <a:t>Unsere Kunden </a:t>
+            </a:r>
           </a:p>
           <a:p>
             <a:r>
               <a:rPr lang="de-DE" sz="2400" dirty="0"/>
-              <a:t>Unsere Kunden </a:t>
-            </a:r>
-          </a:p>
-          <a:p>
-            <a:endParaRPr lang="de-DE" sz="2400" dirty="0"/>
-          </a:p>
-          <a:p>
-            <a:endParaRPr lang="de-DE" sz="2400" dirty="0"/>
-          </a:p>
-          <a:p>
-            <a:endParaRPr lang="de-DE" sz="2400" dirty="0"/>
-          </a:p>
-          <a:p>
-            <a:r>
-              <a:rPr lang="de-DE" sz="2400" dirty="0"/>
-              <a:t>USP 		Unbekannt starke Skalierbarkeit für das Bewirtschaften von </a:t>
-            </a:r>
-          </a:p>
-          <a:p>
-            <a:r>
-              <a:rPr lang="de-DE" sz="2400" dirty="0"/>
-              <a:t>			Algenfarmen in offenen Gewässern</a:t>
+              <a:t>		</a:t>
             </a:r>
           </a:p>
         </p:txBody>
@@ -6194,7 +6179,7 @@
         </p:blipFill>
         <p:spPr>
           <a:xfrm>
-            <a:off x="4686603" y="2249113"/>
+            <a:off x="6146638" y="2245178"/>
             <a:ext cx="914400" cy="914400"/>
           </a:xfrm>
           <a:prstGeom prst="rect">
@@ -6233,7 +6218,7 @@
         </p:blipFill>
         <p:spPr>
           <a:xfrm>
-            <a:off x="6919769" y="2375043"/>
+            <a:off x="8379804" y="2371108"/>
             <a:ext cx="914400" cy="914400"/>
           </a:xfrm>
           <a:prstGeom prst="rect">
@@ -6272,7 +6257,7 @@
         </p:blipFill>
         <p:spPr>
           <a:xfrm>
-            <a:off x="3570020" y="2249113"/>
+            <a:off x="5030055" y="2245178"/>
             <a:ext cx="914400" cy="914400"/>
           </a:xfrm>
           <a:prstGeom prst="rect">
@@ -6311,7 +6296,7 @@
         </p:blipFill>
         <p:spPr>
           <a:xfrm>
-            <a:off x="5803186" y="2239045"/>
+            <a:off x="7263221" y="2235110"/>
             <a:ext cx="914400" cy="914400"/>
           </a:xfrm>
           <a:prstGeom prst="rect">
@@ -6385,6 +6370,85 @@
           <a:lstStyle/>
           <a:p>
             <a:endParaRPr lang="de-DE"/>
+          </a:p>
+        </p:txBody>
+      </p:sp>
+      <p:sp>
+        <p:nvSpPr>
+          <p:cNvPr id="3" name="Textfeld 2">
+            <a:extLst>
+              <a:ext uri="{FF2B5EF4-FFF2-40B4-BE49-F238E27FC236}">
+                <a16:creationId xmlns:a16="http://schemas.microsoft.com/office/drawing/2014/main" id="{1D21C266-8DEA-404B-9F71-DD606857ED66}"/>
+              </a:ext>
+            </a:extLst>
+          </p:cNvPr>
+          <p:cNvSpPr txBox="1"/>
+          <p:nvPr/>
+        </p:nvSpPr>
+        <p:spPr>
+          <a:xfrm>
+            <a:off x="2215873" y="4099015"/>
+            <a:ext cx="8775929" cy="1384995"/>
+          </a:xfrm>
+          <a:prstGeom prst="rect">
+            <a:avLst/>
+          </a:prstGeom>
+          <a:noFill/>
+        </p:spPr>
+        <p:txBody>
+          <a:bodyPr wrap="none" rtlCol="0">
+            <a:spAutoFit/>
+          </a:bodyPr>
+          <a:lstStyle/>
+          <a:p>
+            <a:r>
+              <a:rPr lang="de-DE" sz="2800" dirty="0"/>
+              <a:t>Unbekannt starke Skalierbarkeit für das Bewirtschaften von </a:t>
+            </a:r>
+          </a:p>
+          <a:p>
+            <a:r>
+              <a:rPr lang="de-DE" sz="2800" dirty="0"/>
+              <a:t>			Algenfarmen in offenen Gewässern</a:t>
+            </a:r>
+          </a:p>
+          <a:p>
+            <a:endParaRPr lang="de-DE" sz="2800" dirty="0"/>
+          </a:p>
+        </p:txBody>
+      </p:sp>
+      <p:sp>
+        <p:nvSpPr>
+          <p:cNvPr id="4" name="Textfeld 3">
+            <a:extLst>
+              <a:ext uri="{FF2B5EF4-FFF2-40B4-BE49-F238E27FC236}">
+                <a16:creationId xmlns:a16="http://schemas.microsoft.com/office/drawing/2014/main" id="{5BB08CBF-3EA7-4AF5-9D70-9456A7DAA43E}"/>
+              </a:ext>
+            </a:extLst>
+          </p:cNvPr>
+          <p:cNvSpPr txBox="1"/>
+          <p:nvPr/>
+        </p:nvSpPr>
+        <p:spPr>
+          <a:xfrm>
+            <a:off x="1389419" y="4099015"/>
+            <a:ext cx="760144" cy="523220"/>
+          </a:xfrm>
+          <a:prstGeom prst="rect">
+            <a:avLst/>
+          </a:prstGeom>
+          <a:noFill/>
+        </p:spPr>
+        <p:txBody>
+          <a:bodyPr wrap="none" rtlCol="0">
+            <a:spAutoFit/>
+          </a:bodyPr>
+          <a:lstStyle/>
+          <a:p>
+            <a:r>
+              <a:rPr lang="de-DE" sz="2800" dirty="0"/>
+              <a:t>USP</a:t>
+            </a:r>
           </a:p>
         </p:txBody>
       </p:sp>
@@ -6481,11 +6545,88 @@
                                           </p:stCondLst>
                                         </p:cTn>
                                         <p:tgtEl>
-                                          <p:spTgt spid="7">
-                                            <p:txEl>
-                                              <p:pRg st="7" end="7"/>
-                                            </p:txEl>
-                                          </p:spTgt>
+                                          <p:spTgt spid="13"/>
+                                        </p:tgtEl>
+                                        <p:attrNameLst>
+                                          <p:attrName>style.visibility</p:attrName>
+                                        </p:attrNameLst>
+                                      </p:cBhvr>
+                                      <p:to>
+                                        <p:strVal val="visible"/>
+                                      </p:to>
+                                    </p:set>
+                                  </p:childTnLst>
+                                </p:cTn>
+                              </p:par>
+                              <p:par>
+                                <p:cTn id="11" presetID="1" presetClass="entr" presetSubtype="0" fill="hold" nodeType="withEffect">
+                                  <p:stCondLst>
+                                    <p:cond delay="0"/>
+                                  </p:stCondLst>
+                                  <p:childTnLst>
+                                    <p:set>
+                                      <p:cBhvr>
+                                        <p:cTn id="12" dur="1" fill="hold">
+                                          <p:stCondLst>
+                                            <p:cond delay="0"/>
+                                          </p:stCondLst>
+                                        </p:cTn>
+                                        <p:tgtEl>
+                                          <p:spTgt spid="9"/>
+                                        </p:tgtEl>
+                                        <p:attrNameLst>
+                                          <p:attrName>style.visibility</p:attrName>
+                                        </p:attrNameLst>
+                                      </p:cBhvr>
+                                      <p:to>
+                                        <p:strVal val="visible"/>
+                                      </p:to>
+                                    </p:set>
+                                  </p:childTnLst>
+                                </p:cTn>
+                              </p:par>
+                              <p:par>
+                                <p:cTn id="13" presetID="1" presetClass="entr" presetSubtype="0" fill="hold" nodeType="withEffect">
+                                  <p:stCondLst>
+                                    <p:cond delay="0"/>
+                                  </p:stCondLst>
+                                  <p:childTnLst>
+                                    <p:set>
+                                      <p:cBhvr>
+                                        <p:cTn id="14" dur="1" fill="hold">
+                                          <p:stCondLst>
+                                            <p:cond delay="0"/>
+                                          </p:stCondLst>
+                                        </p:cTn>
+                                        <p:tgtEl>
+                                          <p:spTgt spid="15"/>
+                                        </p:tgtEl>
+                                        <p:attrNameLst>
+                                          <p:attrName>style.visibility</p:attrName>
+                                        </p:attrNameLst>
+                                      </p:cBhvr>
+                                      <p:to>
+                                        <p:strVal val="visible"/>
+                                      </p:to>
+                                    </p:set>
+                                  </p:childTnLst>
+                                </p:cTn>
+                              </p:par>
+                              <p:par>
+                                <p:cTn id="15" presetID="1" presetClass="entr" presetSubtype="0" fill="hold" nodeType="withEffect">
+                                  <p:stCondLst>
+                                    <p:cond delay="0"/>
+                                  </p:stCondLst>
+                                  <p:childTnLst>
+                                    <p:set>
+                                      <p:cBhvr>
+                                        <p:cTn id="16" dur="1" fill="hold">
+                                          <p:stCondLst>
+                                            <p:cond delay="0"/>
+                                          </p:stCondLst>
+                                        </p:cTn>
+                                        <p:tgtEl>
+                                          <p:spTgt spid="11"/>
                                         </p:tgtEl>
                                         <p:attrNameLst>
                                           <p:attrName>style.visibility</p:attrName>
@@ -6505,34 +6646,110 @@
                     </p:cTn>
                   </p:par>
                   <p:par>
-                    <p:cTn id="11" fill="hold">
+                    <p:cTn id="17" fill="hold">
                       <p:stCondLst>
                         <p:cond delay="indefinite"/>
                       </p:stCondLst>
                       <p:childTnLst>
                         <p:par>
-                          <p:cTn id="12" fill="hold">
+                          <p:cTn id="18" fill="hold">
                             <p:stCondLst>
                               <p:cond delay="0"/>
                             </p:stCondLst>
                             <p:childTnLst>
                               <p:par>
-                                <p:cTn id="13" presetID="1" presetClass="entr" presetSubtype="0" fill="hold" nodeType="clickEffect">
+                                <p:cTn id="19" presetID="1" presetClass="entr" presetSubtype="0" fill="hold" grpId="0" nodeType="clickEffect">
                                   <p:stCondLst>
                                     <p:cond delay="0"/>
                                   </p:stCondLst>
                                   <p:childTnLst>
                                     <p:set>
                                       <p:cBhvr>
-                                        <p:cTn id="14" dur="1" fill="hold">
+                                        <p:cTn id="20" dur="1" fill="hold">
                                           <p:stCondLst>
                                             <p:cond delay="0"/>
                                           </p:stCondLst>
                                         </p:cTn>
                                         <p:tgtEl>
-                                          <p:spTgt spid="7">
+                                          <p:spTgt spid="4"/>
+                                        </p:tgtEl>
+                                        <p:attrNameLst>
+                                          <p:attrName>style.visibility</p:attrName>
+                                        </p:attrNameLst>
+                                      </p:cBhvr>
+                                      <p:to>
+                                        <p:strVal val="visible"/>
+                                      </p:to>
+                                    </p:set>
+                                  </p:childTnLst>
+                                </p:cTn>
+                              </p:par>
+                            </p:childTnLst>
+                          </p:cTn>
+                        </p:par>
+                      </p:childTnLst>
+                    </p:cTn>
+                  </p:par>
+                  <p:par>
+                    <p:cTn id="21" fill="hold">
+                      <p:stCondLst>
+                        <p:cond delay="indefinite"/>
+                      </p:stCondLst>
+                      <p:childTnLst>
+                        <p:par>
+                          <p:cTn id="22" fill="hold">
+                            <p:stCondLst>
+                              <p:cond delay="0"/>
+                            </p:stCondLst>
+                            <p:childTnLst>
+                              <p:par>
+                                <p:cTn id="23" presetID="1" presetClass="entr" presetSubtype="0" fill="hold" nodeType="clickEffect">
+                                  <p:stCondLst>
+                                    <p:cond delay="0"/>
+                                  </p:stCondLst>
+                                  <p:childTnLst>
+                                    <p:set>
+                                      <p:cBhvr>
+                                        <p:cTn id="24" dur="1" fill="hold">
+                                          <p:stCondLst>
+                                            <p:cond delay="0"/>
+                                          </p:stCondLst>
+                                        </p:cTn>
+                                        <p:tgtEl>
+                                          <p:spTgt spid="3">
                                             <p:txEl>
-                                              <p:pRg st="8" end="8"/>
+                                              <p:pRg st="0" end="0"/>
+                                            </p:txEl>
+                                          </p:spTgt>
+                                        </p:tgtEl>
+                                        <p:attrNameLst>
+                                          <p:attrName>style.visibility</p:attrName>
+                                        </p:attrNameLst>
+                                      </p:cBhvr>
+                                      <p:to>
+                                        <p:strVal val="visible"/>
+                                      </p:to>
+                                    </p:set>
+                                  </p:childTnLst>
+                                </p:cTn>
+                              </p:par>
+                              <p:par>
+                                <p:cTn id="25" presetID="1" presetClass="entr" presetSubtype="0" fill="hold" nodeType="withEffect">
+                                  <p:stCondLst>
+                                    <p:cond delay="0"/>
+                                  </p:stCondLst>
+                                  <p:childTnLst>
+                                    <p:set>
+                                      <p:cBhvr>
+                                        <p:cTn id="26" dur="1" fill="hold">
+                                          <p:stCondLst>
+                                            <p:cond delay="0"/>
+                                          </p:stCondLst>
+                                        </p:cTn>
+                                        <p:tgtEl>
+                                          <p:spTgt spid="3">
+                                            <p:txEl>
+                                              <p:pRg st="1" end="1"/>
                                             </p:txEl>
                                           </p:spTgt>
                                         </p:tgtEl>
@@ -6574,6 +6791,9 @@
         </p:cTn>
       </p:par>
     </p:tnLst>
+    <p:bldLst>
+      <p:bldP spid="4" grpId="0"/>
+    </p:bldLst>
   </p:timing>
 </p:sld>
 </file>
@@ -6584,7 +6804,7 @@
     <p:bg>
       <p:bgPr>
         <a:solidFill>
-          <a:srgbClr val="4960A6"/>
+          <a:srgbClr val="2E2B21"/>
         </a:solidFill>
         <a:effectLst/>
       </p:bgPr>
@@ -9053,7 +9273,7 @@
     <p:bg>
       <p:bgPr>
         <a:solidFill>
-          <a:srgbClr val="4960A6"/>
+          <a:srgbClr val="2E2B21"/>
         </a:solidFill>
         <a:effectLst/>
       </p:bgPr>
@@ -9074,134 +9294,6 @@
       </p:grpSpPr>
       <p:sp>
         <p:nvSpPr>
-          <p:cNvPr id="22" name="Rectangle 21">
-            <a:extLst>
-              <a:ext uri="{FF2B5EF4-FFF2-40B4-BE49-F238E27FC236}">
-                <a16:creationId xmlns:a16="http://schemas.microsoft.com/office/drawing/2014/main" id="{44B3F5F5-166C-4694-B20A-3F8218AF7D03}"/>
-              </a:ext>
-              <a:ext uri="{C183D7F6-B498-43B3-948B-1728B52AA6E4}">
-                <adec:decorative xmlns:adec="http://schemas.microsoft.com/office/drawing/2017/decorative" val="1"/>
-              </a:ext>
-            </a:extLst>
-          </p:cNvPr>
-          <p:cNvSpPr>
-            <a:spLocks noGrp="1" noRot="1" noChangeAspect="1" noMove="1" noResize="1" noEditPoints="1" noAdjustHandles="1" noChangeArrowheads="1" noChangeShapeType="1" noTextEdit="1"/>
-          </p:cNvSpPr>
-          <p:nvPr>
-            <p:extLst>
-              <p:ext uri="{386F3935-93C4-4BCD-93E2-E3B085C9AB24}">
-                <p16:designElem xmlns:p16="http://schemas.microsoft.com/office/powerpoint/2015/main" val="1"/>
-              </p:ext>
-            </p:extLst>
-          </p:nvPr>
-        </p:nvSpPr>
-        <p:spPr>
-          <a:xfrm>
-            <a:off x="0" y="0"/>
-            <a:ext cx="12192000" cy="6858000"/>
-          </a:xfrm>
-          <a:prstGeom prst="rect">
-            <a:avLst/>
-          </a:prstGeom>
-          <a:solidFill>
-            <a:schemeClr val="bg2"/>
-          </a:solidFill>
-          <a:ln>
-            <a:noFill/>
-          </a:ln>
-        </p:spPr>
-        <p:style>
-          <a:lnRef idx="2">
-            <a:schemeClr val="accent1">
-              <a:shade val="50000"/>
-            </a:schemeClr>
-          </a:lnRef>
-          <a:fillRef idx="1">
-            <a:schemeClr val="accent1"/>
-          </a:fillRef>
-          <a:effectRef idx="0">
-            <a:schemeClr val="accent1"/>
-          </a:effectRef>
-          <a:fontRef idx="minor">
-            <a:schemeClr val="lt1"/>
-          </a:fontRef>
-        </p:style>
-        <p:txBody>
-          <a:bodyPr rtlCol="0" anchor="ctr"/>
-          <a:lstStyle/>
-          <a:p>
-            <a:pPr algn="ctr"/>
-            <a:endParaRPr lang="en-US"/>
-          </a:p>
-        </p:txBody>
-      </p:sp>
-      <p:sp>
-        <p:nvSpPr>
-          <p:cNvPr id="24" name="Rectangle 23">
-            <a:extLst>
-              <a:ext uri="{FF2B5EF4-FFF2-40B4-BE49-F238E27FC236}">
-                <a16:creationId xmlns:a16="http://schemas.microsoft.com/office/drawing/2014/main" id="{9E67A204-FB90-4B26-B155-3FA8064AD2DF}"/>
-              </a:ext>
-              <a:ext uri="{C183D7F6-B498-43B3-948B-1728B52AA6E4}">
-                <adec:decorative xmlns:adec="http://schemas.microsoft.com/office/drawing/2017/decorative" val="1"/>
-              </a:ext>
-            </a:extLst>
-          </p:cNvPr>
-          <p:cNvSpPr>
-            <a:spLocks noGrp="1" noRot="1" noChangeAspect="1" noMove="1" noResize="1" noEditPoints="1" noAdjustHandles="1" noChangeArrowheads="1" noChangeShapeType="1" noTextEdit="1"/>
-          </p:cNvSpPr>
-          <p:nvPr>
-            <p:extLst>
-              <p:ext uri="{386F3935-93C4-4BCD-93E2-E3B085C9AB24}">
-                <p16:designElem xmlns:p16="http://schemas.microsoft.com/office/powerpoint/2015/main" val="1"/>
-              </p:ext>
-            </p:extLst>
-          </p:nvPr>
-        </p:nvSpPr>
-        <p:spPr>
-          <a:xfrm>
-            <a:off x="477012" y="480060"/>
-            <a:ext cx="11237976" cy="5897880"/>
-          </a:xfrm>
-          <a:prstGeom prst="rect">
-            <a:avLst/>
-          </a:prstGeom>
-          <a:solidFill>
-            <a:schemeClr val="bg1"/>
-          </a:solidFill>
-          <a:ln w="22225">
-            <a:solidFill>
-              <a:srgbClr val="C17F63"/>
-            </a:solidFill>
-          </a:ln>
-        </p:spPr>
-        <p:style>
-          <a:lnRef idx="2">
-            <a:schemeClr val="accent1">
-              <a:shade val="50000"/>
-            </a:schemeClr>
-          </a:lnRef>
-          <a:fillRef idx="1">
-            <a:schemeClr val="accent1"/>
-          </a:fillRef>
-          <a:effectRef idx="0">
-            <a:schemeClr val="accent1"/>
-          </a:effectRef>
-          <a:fontRef idx="minor">
-            <a:schemeClr val="lt1"/>
-          </a:fontRef>
-        </p:style>
-        <p:txBody>
-          <a:bodyPr rtlCol="0" anchor="ctr"/>
-          <a:lstStyle/>
-          <a:p>
-            <a:pPr algn="ctr"/>
-            <a:endParaRPr lang="en-US"/>
-          </a:p>
-        </p:txBody>
-      </p:sp>
-      <p:sp>
-        <p:nvSpPr>
           <p:cNvPr id="2" name="Textfeld 1">
             <a:extLst>
               <a:ext uri="{FF2B5EF4-FFF2-40B4-BE49-F238E27FC236}">
@@ -9247,20 +9339,20 @@
           <p:nvPr>
             <p:extLst>
               <p:ext uri="{D42A27DB-BD31-4B8C-83A1-F6EECF244321}">
-                <p14:modId xmlns:p14="http://schemas.microsoft.com/office/powerpoint/2010/main" val="2798679690"/>
+                <p14:modId xmlns:p14="http://schemas.microsoft.com/office/powerpoint/2010/main" val="3811719658"/>
               </p:ext>
             </p:extLst>
           </p:nvPr>
         </p:nvGraphicFramePr>
         <p:xfrm>
-          <a:off x="4189046" y="480060"/>
-          <a:ext cx="6002215" cy="8492631"/>
+          <a:off x="5650018" y="0"/>
+          <a:ext cx="6613699" cy="8492631"/>
         </p:xfrm>
         <a:graphic>
           <a:graphicData uri="http://schemas.openxmlformats.org/presentationml/2006/ole">
             <mc:AlternateContent xmlns:mc="http://schemas.openxmlformats.org/markup-compatibility/2006">
               <mc:Choice xmlns:v="urn:schemas-microsoft-com:vml" Requires="v">
-                <p:oleObj spid="_x0000_s3078" name="Acrobat Document" r:id="rId3" imgW="4533723" imgH="6415677" progId="AcroExch.Document.DC">
+                <p:oleObj spid="_x0000_s3084" name="Acrobat Document" r:id="rId3" imgW="4533723" imgH="6415677" progId="AcroExch.Document.DC">
                   <p:embed/>
                 </p:oleObj>
               </mc:Choice>
@@ -9281,8 +9373,8 @@
                     </p:blipFill>
                     <p:spPr>
                       <a:xfrm>
-                        <a:off x="4189046" y="480060"/>
-                        <a:ext cx="6002215" cy="8492631"/>
+                        <a:off x="5650018" y="0"/>
+                        <a:ext cx="6613699" cy="8492631"/>
                       </a:xfrm>
                       <a:prstGeom prst="rect">
                         <a:avLst/>
@@ -9770,8 +9862,8 @@
         </p:nvSpPr>
         <p:spPr>
           <a:xfrm>
-            <a:off x="1028700" y="945573"/>
-            <a:ext cx="2628900" cy="369332"/>
+            <a:off x="778165" y="1127999"/>
+            <a:ext cx="5228188" cy="646331"/>
           </a:xfrm>
           <a:prstGeom prst="rect">
             <a:avLst/>
@@ -9785,12 +9877,42 @@
           <a:lstStyle/>
           <a:p>
             <a:r>
-              <a:rPr lang="de-DE" dirty="0"/>
-              <a:t>Einflussmatrix ?</a:t>
+              <a:rPr lang="de-DE" sz="3600" dirty="0"/>
+              <a:t>Die wichtigsten Einflüsse:  </a:t>
             </a:r>
           </a:p>
         </p:txBody>
       </p:sp>
+      <p:pic>
+        <p:nvPicPr>
+          <p:cNvPr id="5" name="Grafik 4">
+            <a:extLst>
+              <a:ext uri="{FF2B5EF4-FFF2-40B4-BE49-F238E27FC236}">
+                <a16:creationId xmlns:a16="http://schemas.microsoft.com/office/drawing/2014/main" id="{DF4A3126-A246-4229-96C3-DE151E3A2F81}"/>
+              </a:ext>
+            </a:extLst>
+          </p:cNvPr>
+          <p:cNvPicPr>
+            <a:picLocks noChangeAspect="1"/>
+          </p:cNvPicPr>
+          <p:nvPr/>
+        </p:nvPicPr>
+        <p:blipFill>
+          <a:blip r:embed="rId2"/>
+          <a:stretch>
+            <a:fillRect/>
+          </a:stretch>
+        </p:blipFill>
+        <p:spPr>
+          <a:xfrm>
+            <a:off x="626267" y="2106801"/>
+            <a:ext cx="10939466" cy="3517321"/>
+          </a:xfrm>
+          <a:prstGeom prst="rect">
+            <a:avLst/>
+          </a:prstGeom>
+        </p:spPr>
+      </p:pic>
     </p:spTree>
     <p:extLst>
       <p:ext uri="{BB962C8B-B14F-4D97-AF65-F5344CB8AC3E}">

</xml_diff>

<commit_message>
Präsi ein bisschen schicker gemacht
</commit_message>
<xml_diff>
--- a/Meilenstein 1/Präsentation/Präsentation MS1.pptx
+++ b/Meilenstein 1/Präsentation/Präsentation MS1.pptx
@@ -5,31 +5,30 @@
     <p:sldMasterId id="2147483756" r:id="rId1"/>
   </p:sldMasterIdLst>
   <p:notesMasterIdLst>
-    <p:notesMasterId r:id="rId24"/>
+    <p:notesMasterId r:id="rId23"/>
   </p:notesMasterIdLst>
   <p:sldIdLst>
-    <p:sldId id="269" r:id="rId2"/>
-    <p:sldId id="256" r:id="rId3"/>
-    <p:sldId id="259" r:id="rId4"/>
-    <p:sldId id="265" r:id="rId5"/>
-    <p:sldId id="260" r:id="rId6"/>
-    <p:sldId id="271" r:id="rId7"/>
-    <p:sldId id="262" r:id="rId8"/>
-    <p:sldId id="267" r:id="rId9"/>
-    <p:sldId id="261" r:id="rId10"/>
-    <p:sldId id="273" r:id="rId11"/>
-    <p:sldId id="268" r:id="rId12"/>
-    <p:sldId id="270" r:id="rId13"/>
-    <p:sldId id="275" r:id="rId14"/>
-    <p:sldId id="276" r:id="rId15"/>
-    <p:sldId id="274" r:id="rId16"/>
-    <p:sldId id="279" r:id="rId17"/>
-    <p:sldId id="282" r:id="rId18"/>
-    <p:sldId id="278" r:id="rId19"/>
-    <p:sldId id="280" r:id="rId20"/>
-    <p:sldId id="277" r:id="rId21"/>
-    <p:sldId id="281" r:id="rId22"/>
-    <p:sldId id="272" r:id="rId23"/>
+    <p:sldId id="256" r:id="rId2"/>
+    <p:sldId id="259" r:id="rId3"/>
+    <p:sldId id="265" r:id="rId4"/>
+    <p:sldId id="260" r:id="rId5"/>
+    <p:sldId id="271" r:id="rId6"/>
+    <p:sldId id="262" r:id="rId7"/>
+    <p:sldId id="267" r:id="rId8"/>
+    <p:sldId id="261" r:id="rId9"/>
+    <p:sldId id="273" r:id="rId10"/>
+    <p:sldId id="268" r:id="rId11"/>
+    <p:sldId id="270" r:id="rId12"/>
+    <p:sldId id="275" r:id="rId13"/>
+    <p:sldId id="276" r:id="rId14"/>
+    <p:sldId id="274" r:id="rId15"/>
+    <p:sldId id="279" r:id="rId16"/>
+    <p:sldId id="282" r:id="rId17"/>
+    <p:sldId id="278" r:id="rId18"/>
+    <p:sldId id="280" r:id="rId19"/>
+    <p:sldId id="277" r:id="rId20"/>
+    <p:sldId id="281" r:id="rId21"/>
+    <p:sldId id="272" r:id="rId22"/>
   </p:sldIdLst>
   <p:sldSz cx="12192000" cy="6858000"/>
   <p:notesSz cx="6858000" cy="9144000"/>
@@ -218,7 +217,7 @@
           <a:p>
             <a:fld id="{6388D3DC-C3A5-4BB0-A509-7EA8E98E9A54}" type="datetimeFigureOut">
               <a:rPr lang="de-DE" smtClean="0"/>
-              <a:t>08.11.2020</a:t>
+              <a:t>09.11.2020</a:t>
             </a:fld>
             <a:endParaRPr lang="de-DE"/>
           </a:p>
@@ -637,7 +636,7 @@
           <a:p>
             <a:fld id="{052FE770-E0D2-4419-A252-3771C9401F80}" type="datetimeFigureOut">
               <a:rPr lang="de-DE" smtClean="0"/>
-              <a:t>08.11.2020</a:t>
+              <a:t>09.11.2020</a:t>
             </a:fld>
             <a:endParaRPr lang="de-DE"/>
           </a:p>
@@ -880,7 +879,7 @@
           <a:p>
             <a:fld id="{052FE770-E0D2-4419-A252-3771C9401F80}" type="datetimeFigureOut">
               <a:rPr lang="de-DE" smtClean="0"/>
-              <a:t>08.11.2020</a:t>
+              <a:t>09.11.2020</a:t>
             </a:fld>
             <a:endParaRPr lang="de-DE"/>
           </a:p>
@@ -1060,7 +1059,7 @@
           <a:p>
             <a:fld id="{052FE770-E0D2-4419-A252-3771C9401F80}" type="datetimeFigureOut">
               <a:rPr lang="de-DE" smtClean="0"/>
-              <a:t>08.11.2020</a:t>
+              <a:t>09.11.2020</a:t>
             </a:fld>
             <a:endParaRPr lang="de-DE"/>
           </a:p>
@@ -1265,7 +1264,7 @@
           <a:p>
             <a:fld id="{052FE770-E0D2-4419-A252-3771C9401F80}" type="datetimeFigureOut">
               <a:rPr lang="de-DE" smtClean="0"/>
-              <a:t>08.11.2020</a:t>
+              <a:t>09.11.2020</a:t>
             </a:fld>
             <a:endParaRPr lang="de-DE"/>
           </a:p>
@@ -1522,7 +1521,7 @@
           <a:p>
             <a:fld id="{052FE770-E0D2-4419-A252-3771C9401F80}" type="datetimeFigureOut">
               <a:rPr lang="de-DE" smtClean="0"/>
-              <a:t>08.11.2020</a:t>
+              <a:t>09.11.2020</a:t>
             </a:fld>
             <a:endParaRPr lang="de-DE"/>
           </a:p>
@@ -1869,7 +1868,7 @@
           <a:p>
             <a:fld id="{052FE770-E0D2-4419-A252-3771C9401F80}" type="datetimeFigureOut">
               <a:rPr lang="de-DE" smtClean="0"/>
-              <a:t>08.11.2020</a:t>
+              <a:t>09.11.2020</a:t>
             </a:fld>
             <a:endParaRPr lang="de-DE"/>
           </a:p>
@@ -2271,7 +2270,7 @@
           <a:p>
             <a:fld id="{052FE770-E0D2-4419-A252-3771C9401F80}" type="datetimeFigureOut">
               <a:rPr lang="de-DE" smtClean="0"/>
-              <a:t>08.11.2020</a:t>
+              <a:t>09.11.2020</a:t>
             </a:fld>
             <a:endParaRPr lang="de-DE"/>
           </a:p>
@@ -2389,7 +2388,7 @@
           <a:p>
             <a:fld id="{052FE770-E0D2-4419-A252-3771C9401F80}" type="datetimeFigureOut">
               <a:rPr lang="de-DE" smtClean="0"/>
-              <a:t>08.11.2020</a:t>
+              <a:t>09.11.2020</a:t>
             </a:fld>
             <a:endParaRPr lang="de-DE"/>
           </a:p>
@@ -2484,7 +2483,7 @@
           <a:p>
             <a:fld id="{052FE770-E0D2-4419-A252-3771C9401F80}" type="datetimeFigureOut">
               <a:rPr lang="de-DE" smtClean="0"/>
-              <a:t>08.11.2020</a:t>
+              <a:t>09.11.2020</a:t>
             </a:fld>
             <a:endParaRPr lang="de-DE"/>
           </a:p>
@@ -2774,7 +2773,7 @@
           <a:p>
             <a:fld id="{052FE770-E0D2-4419-A252-3771C9401F80}" type="datetimeFigureOut">
               <a:rPr lang="de-DE" smtClean="0"/>
-              <a:t>08.11.2020</a:t>
+              <a:t>09.11.2020</a:t>
             </a:fld>
             <a:endParaRPr lang="de-DE"/>
           </a:p>
@@ -3054,7 +3053,7 @@
           <a:p>
             <a:fld id="{052FE770-E0D2-4419-A252-3771C9401F80}" type="datetimeFigureOut">
               <a:rPr lang="de-DE" smtClean="0"/>
-              <a:t>08.11.2020</a:t>
+              <a:t>09.11.2020</a:t>
             </a:fld>
             <a:endParaRPr lang="de-DE"/>
           </a:p>
@@ -3304,7 +3303,7 @@
           <a:p>
             <a:fld id="{052FE770-E0D2-4419-A252-3771C9401F80}" type="datetimeFigureOut">
               <a:rPr lang="de-DE" smtClean="0"/>
-              <a:t>08.11.2020</a:t>
+              <a:t>09.11.2020</a:t>
             </a:fld>
             <a:endParaRPr lang="de-DE"/>
           </a:p>
@@ -3790,7 +3789,7 @@
 </file>
 
 <file path=ppt/slides/slide1.xml><?xml version="1.0" encoding="utf-8"?>
-<p:sld xmlns:a="http://schemas.openxmlformats.org/drawingml/2006/main" xmlns:r="http://schemas.openxmlformats.org/officeDocument/2006/relationships" xmlns:p="http://schemas.openxmlformats.org/presentationml/2006/main" show="0">
+<p:sld xmlns:a="http://schemas.openxmlformats.org/drawingml/2006/main" xmlns:r="http://schemas.openxmlformats.org/officeDocument/2006/relationships" xmlns:p="http://schemas.openxmlformats.org/presentationml/2006/main" showMasterSp="0">
   <p:cSld>
     <p:bg>
       <p:bgPr>
@@ -3814,306 +3813,12 @@
           <a:chExt cx="0" cy="0"/>
         </a:xfrm>
       </p:grpSpPr>
-      <p:sp>
-        <p:nvSpPr>
-          <p:cNvPr id="22" name="Rectangle 21">
+      <p:pic>
+        <p:nvPicPr>
+          <p:cNvPr id="3" name="Grafik 2">
             <a:extLst>
               <a:ext uri="{FF2B5EF4-FFF2-40B4-BE49-F238E27FC236}">
-                <a16:creationId xmlns:a16="http://schemas.microsoft.com/office/drawing/2014/main" id="{44B3F5F5-166C-4694-B20A-3F8218AF7D03}"/>
-              </a:ext>
-              <a:ext uri="{C183D7F6-B498-43B3-948B-1728B52AA6E4}">
-                <adec:decorative xmlns:adec="http://schemas.microsoft.com/office/drawing/2017/decorative" val="1"/>
-              </a:ext>
-            </a:extLst>
-          </p:cNvPr>
-          <p:cNvSpPr>
-            <a:spLocks noGrp="1" noRot="1" noChangeAspect="1" noMove="1" noResize="1" noEditPoints="1" noAdjustHandles="1" noChangeArrowheads="1" noChangeShapeType="1" noTextEdit="1"/>
-          </p:cNvSpPr>
-          <p:nvPr>
-            <p:extLst>
-              <p:ext uri="{386F3935-93C4-4BCD-93E2-E3B085C9AB24}">
-                <p16:designElem xmlns:p16="http://schemas.microsoft.com/office/powerpoint/2015/main" val="1"/>
-              </p:ext>
-            </p:extLst>
-          </p:nvPr>
-        </p:nvSpPr>
-        <p:spPr>
-          <a:xfrm>
-            <a:off x="0" y="0"/>
-            <a:ext cx="12192000" cy="6858000"/>
-          </a:xfrm>
-          <a:prstGeom prst="rect">
-            <a:avLst/>
-          </a:prstGeom>
-          <a:solidFill>
-            <a:schemeClr val="bg2"/>
-          </a:solidFill>
-          <a:ln>
-            <a:noFill/>
-          </a:ln>
-        </p:spPr>
-        <p:style>
-          <a:lnRef idx="2">
-            <a:schemeClr val="accent1">
-              <a:shade val="50000"/>
-            </a:schemeClr>
-          </a:lnRef>
-          <a:fillRef idx="1">
-            <a:schemeClr val="accent1"/>
-          </a:fillRef>
-          <a:effectRef idx="0">
-            <a:schemeClr val="accent1"/>
-          </a:effectRef>
-          <a:fontRef idx="minor">
-            <a:schemeClr val="lt1"/>
-          </a:fontRef>
-        </p:style>
-        <p:txBody>
-          <a:bodyPr rtlCol="0" anchor="ctr"/>
-          <a:lstStyle/>
-          <a:p>
-            <a:pPr algn="ctr"/>
-            <a:endParaRPr lang="en-US"/>
-          </a:p>
-        </p:txBody>
-      </p:sp>
-      <p:sp>
-        <p:nvSpPr>
-          <p:cNvPr id="24" name="Rectangle 23">
-            <a:extLst>
-              <a:ext uri="{FF2B5EF4-FFF2-40B4-BE49-F238E27FC236}">
-                <a16:creationId xmlns:a16="http://schemas.microsoft.com/office/drawing/2014/main" id="{9E67A204-FB90-4B26-B155-3FA8064AD2DF}"/>
-              </a:ext>
-              <a:ext uri="{C183D7F6-B498-43B3-948B-1728B52AA6E4}">
-                <adec:decorative xmlns:adec="http://schemas.microsoft.com/office/drawing/2017/decorative" val="1"/>
-              </a:ext>
-            </a:extLst>
-          </p:cNvPr>
-          <p:cNvSpPr>
-            <a:spLocks noGrp="1" noRot="1" noChangeAspect="1" noMove="1" noResize="1" noEditPoints="1" noAdjustHandles="1" noChangeArrowheads="1" noChangeShapeType="1" noTextEdit="1"/>
-          </p:cNvSpPr>
-          <p:nvPr>
-            <p:extLst>
-              <p:ext uri="{386F3935-93C4-4BCD-93E2-E3B085C9AB24}">
-                <p16:designElem xmlns:p16="http://schemas.microsoft.com/office/powerpoint/2015/main" val="1"/>
-              </p:ext>
-            </p:extLst>
-          </p:nvPr>
-        </p:nvSpPr>
-        <p:spPr>
-          <a:xfrm>
-            <a:off x="477012" y="480060"/>
-            <a:ext cx="11237976" cy="5897880"/>
-          </a:xfrm>
-          <a:prstGeom prst="rect">
-            <a:avLst/>
-          </a:prstGeom>
-          <a:solidFill>
-            <a:schemeClr val="bg1"/>
-          </a:solidFill>
-          <a:ln w="22225">
-            <a:solidFill>
-              <a:srgbClr val="C17F63"/>
-            </a:solidFill>
-          </a:ln>
-        </p:spPr>
-        <p:style>
-          <a:lnRef idx="2">
-            <a:schemeClr val="accent1">
-              <a:shade val="50000"/>
-            </a:schemeClr>
-          </a:lnRef>
-          <a:fillRef idx="1">
-            <a:schemeClr val="accent1"/>
-          </a:fillRef>
-          <a:effectRef idx="0">
-            <a:schemeClr val="accent1"/>
-          </a:effectRef>
-          <a:fontRef idx="minor">
-            <a:schemeClr val="lt1"/>
-          </a:fontRef>
-        </p:style>
-        <p:txBody>
-          <a:bodyPr rtlCol="0" anchor="ctr"/>
-          <a:lstStyle/>
-          <a:p>
-            <a:pPr algn="ctr"/>
-            <a:endParaRPr lang="en-US"/>
-          </a:p>
-        </p:txBody>
-      </p:sp>
-    </p:spTree>
-    <p:extLst>
-      <p:ext uri="{BB962C8B-B14F-4D97-AF65-F5344CB8AC3E}">
-        <p14:creationId xmlns:p14="http://schemas.microsoft.com/office/powerpoint/2010/main" val="4080306412"/>
-      </p:ext>
-    </p:extLst>
-  </p:cSld>
-  <p:clrMapOvr>
-    <a:masterClrMapping/>
-  </p:clrMapOvr>
-</p:sld>
-</file>
-
-<file path=ppt/slides/slide10.xml><?xml version="1.0" encoding="utf-8"?>
-<p:sld xmlns:a="http://schemas.openxmlformats.org/drawingml/2006/main" xmlns:r="http://schemas.openxmlformats.org/officeDocument/2006/relationships" xmlns:p="http://schemas.openxmlformats.org/presentationml/2006/main">
-  <p:cSld>
-    <p:bg>
-      <p:bgPr>
-        <a:solidFill>
-          <a:srgbClr val="4960A6"/>
-        </a:solidFill>
-        <a:effectLst/>
-      </p:bgPr>
-    </p:bg>
-    <p:spTree>
-      <p:nvGrpSpPr>
-        <p:cNvPr id="1" name=""/>
-        <p:cNvGrpSpPr/>
-        <p:nvPr/>
-      </p:nvGrpSpPr>
-      <p:grpSpPr>
-        <a:xfrm>
-          <a:off x="0" y="0"/>
-          <a:ext cx="0" cy="0"/>
-          <a:chOff x="0" y="0"/>
-          <a:chExt cx="0" cy="0"/>
-        </a:xfrm>
-      </p:grpSpPr>
-      <p:sp>
-        <p:nvSpPr>
-          <p:cNvPr id="22" name="Rectangle 21">
-            <a:extLst>
-              <a:ext uri="{FF2B5EF4-FFF2-40B4-BE49-F238E27FC236}">
-                <a16:creationId xmlns:a16="http://schemas.microsoft.com/office/drawing/2014/main" id="{44B3F5F5-166C-4694-B20A-3F8218AF7D03}"/>
-              </a:ext>
-              <a:ext uri="{C183D7F6-B498-43B3-948B-1728B52AA6E4}">
-                <adec:decorative xmlns:adec="http://schemas.microsoft.com/office/drawing/2017/decorative" val="1"/>
-              </a:ext>
-            </a:extLst>
-          </p:cNvPr>
-          <p:cNvSpPr>
-            <a:spLocks noGrp="1" noRot="1" noChangeAspect="1" noMove="1" noResize="1" noEditPoints="1" noAdjustHandles="1" noChangeArrowheads="1" noChangeShapeType="1" noTextEdit="1"/>
-          </p:cNvSpPr>
-          <p:nvPr>
-            <p:extLst>
-              <p:ext uri="{386F3935-93C4-4BCD-93E2-E3B085C9AB24}">
-                <p16:designElem xmlns:p16="http://schemas.microsoft.com/office/powerpoint/2015/main" val="1"/>
-              </p:ext>
-            </p:extLst>
-          </p:nvPr>
-        </p:nvSpPr>
-        <p:spPr>
-          <a:xfrm>
-            <a:off x="0" y="0"/>
-            <a:ext cx="12192000" cy="6858000"/>
-          </a:xfrm>
-          <a:prstGeom prst="rect">
-            <a:avLst/>
-          </a:prstGeom>
-          <a:solidFill>
-            <a:schemeClr val="bg2"/>
-          </a:solidFill>
-          <a:ln>
-            <a:noFill/>
-          </a:ln>
-        </p:spPr>
-        <p:style>
-          <a:lnRef idx="2">
-            <a:schemeClr val="accent1">
-              <a:shade val="50000"/>
-            </a:schemeClr>
-          </a:lnRef>
-          <a:fillRef idx="1">
-            <a:schemeClr val="accent1"/>
-          </a:fillRef>
-          <a:effectRef idx="0">
-            <a:schemeClr val="accent1"/>
-          </a:effectRef>
-          <a:fontRef idx="minor">
-            <a:schemeClr val="lt1"/>
-          </a:fontRef>
-        </p:style>
-        <p:txBody>
-          <a:bodyPr rtlCol="0" anchor="ctr"/>
-          <a:lstStyle/>
-          <a:p>
-            <a:pPr algn="ctr"/>
-            <a:endParaRPr lang="en-US"/>
-          </a:p>
-        </p:txBody>
-      </p:sp>
-      <p:sp>
-        <p:nvSpPr>
-          <p:cNvPr id="24" name="Rectangle 23">
-            <a:extLst>
-              <a:ext uri="{FF2B5EF4-FFF2-40B4-BE49-F238E27FC236}">
-                <a16:creationId xmlns:a16="http://schemas.microsoft.com/office/drawing/2014/main" id="{9E67A204-FB90-4B26-B155-3FA8064AD2DF}"/>
-              </a:ext>
-              <a:ext uri="{C183D7F6-B498-43B3-948B-1728B52AA6E4}">
-                <adec:decorative xmlns:adec="http://schemas.microsoft.com/office/drawing/2017/decorative" val="1"/>
-              </a:ext>
-            </a:extLst>
-          </p:cNvPr>
-          <p:cNvSpPr>
-            <a:spLocks noGrp="1" noRot="1" noChangeAspect="1" noMove="1" noResize="1" noEditPoints="1" noAdjustHandles="1" noChangeArrowheads="1" noChangeShapeType="1" noTextEdit="1"/>
-          </p:cNvSpPr>
-          <p:nvPr>
-            <p:extLst>
-              <p:ext uri="{386F3935-93C4-4BCD-93E2-E3B085C9AB24}">
-                <p16:designElem xmlns:p16="http://schemas.microsoft.com/office/powerpoint/2015/main" val="1"/>
-              </p:ext>
-            </p:extLst>
-          </p:nvPr>
-        </p:nvSpPr>
-        <p:spPr>
-          <a:xfrm>
-            <a:off x="477012" y="480060"/>
-            <a:ext cx="11237976" cy="5897880"/>
-          </a:xfrm>
-          <a:prstGeom prst="rect">
-            <a:avLst/>
-          </a:prstGeom>
-          <a:solidFill>
-            <a:schemeClr val="bg1"/>
-          </a:solidFill>
-          <a:ln w="22225">
-            <a:solidFill>
-              <a:srgbClr val="C17F63"/>
-            </a:solidFill>
-          </a:ln>
-        </p:spPr>
-        <p:style>
-          <a:lnRef idx="2">
-            <a:schemeClr val="accent1">
-              <a:shade val="50000"/>
-            </a:schemeClr>
-          </a:lnRef>
-          <a:fillRef idx="1">
-            <a:schemeClr val="accent1"/>
-          </a:fillRef>
-          <a:effectRef idx="0">
-            <a:schemeClr val="accent1"/>
-          </a:effectRef>
-          <a:fontRef idx="minor">
-            <a:schemeClr val="lt1"/>
-          </a:fontRef>
-        </p:style>
-        <p:txBody>
-          <a:bodyPr rtlCol="0" anchor="ctr"/>
-          <a:lstStyle/>
-          <a:p>
-            <a:pPr algn="ctr"/>
-            <a:endParaRPr lang="en-US"/>
-          </a:p>
-        </p:txBody>
-      </p:sp>
-      <p:pic>
-        <p:nvPicPr>
-          <p:cNvPr id="3" name="Grafik 2" descr="Ein Bild, das schwimmend, grün, sitzend, haltend enthält.&#10;&#10;Automatisch generierte Beschreibung">
-            <a:extLst>
-              <a:ext uri="{FF2B5EF4-FFF2-40B4-BE49-F238E27FC236}">
-                <a16:creationId xmlns:a16="http://schemas.microsoft.com/office/drawing/2014/main" id="{79A94BF5-5C1D-4210-B325-A8962E06FB12}"/>
+                <a16:creationId xmlns:a16="http://schemas.microsoft.com/office/drawing/2014/main" id="{723B6203-3323-4168-A356-6BCF681C60F9}"/>
               </a:ext>
             </a:extLst>
           </p:cNvPr>
@@ -4136,53 +3841,18 @@
         </p:blipFill>
         <p:spPr>
           <a:xfrm>
-            <a:off x="1153668" y="1263115"/>
-            <a:ext cx="9884664" cy="5073075"/>
+            <a:off x="2667000" y="0"/>
+            <a:ext cx="6858000" cy="6858000"/>
           </a:xfrm>
           <a:prstGeom prst="rect">
             <a:avLst/>
           </a:prstGeom>
         </p:spPr>
       </p:pic>
-      <p:sp>
-        <p:nvSpPr>
-          <p:cNvPr id="4" name="Textfeld 3">
-            <a:extLst>
-              <a:ext uri="{FF2B5EF4-FFF2-40B4-BE49-F238E27FC236}">
-                <a16:creationId xmlns:a16="http://schemas.microsoft.com/office/drawing/2014/main" id="{E5DEB3FE-FEC3-4ACC-B79E-F749C8194B3C}"/>
-              </a:ext>
-            </a:extLst>
-          </p:cNvPr>
-          <p:cNvSpPr txBox="1"/>
-          <p:nvPr/>
-        </p:nvSpPr>
-        <p:spPr>
-          <a:xfrm>
-            <a:off x="3439856" y="548422"/>
-            <a:ext cx="5312288" cy="646331"/>
-          </a:xfrm>
-          <a:prstGeom prst="rect">
-            <a:avLst/>
-          </a:prstGeom>
-          <a:noFill/>
-        </p:spPr>
-        <p:txBody>
-          <a:bodyPr wrap="none" rtlCol="0">
-            <a:spAutoFit/>
-          </a:bodyPr>
-          <a:lstStyle/>
-          <a:p>
-            <a:r>
-              <a:rPr lang="de-DE" sz="3600" dirty="0"/>
-              <a:t>Automatisierte Algenfarmen</a:t>
-            </a:r>
-          </a:p>
-        </p:txBody>
-      </p:sp>
     </p:spTree>
     <p:extLst>
       <p:ext uri="{BB962C8B-B14F-4D97-AF65-F5344CB8AC3E}">
-        <p14:creationId xmlns:p14="http://schemas.microsoft.com/office/powerpoint/2010/main" val="112858198"/>
+        <p14:creationId xmlns:p14="http://schemas.microsoft.com/office/powerpoint/2010/main" val="1849569525"/>
       </p:ext>
     </p:extLst>
   </p:cSld>
@@ -4192,7 +3862,7 @@
 </p:sld>
 </file>
 
-<file path=ppt/slides/slide11.xml><?xml version="1.0" encoding="utf-8"?>
+<file path=ppt/slides/slide10.xml><?xml version="1.0" encoding="utf-8"?>
 <p:sld xmlns:a="http://schemas.openxmlformats.org/drawingml/2006/main" xmlns:r="http://schemas.openxmlformats.org/officeDocument/2006/relationships" xmlns:p="http://schemas.openxmlformats.org/presentationml/2006/main">
   <p:cSld>
     <p:bg>
@@ -5138,7 +4808,7 @@
 </p:sld>
 </file>
 
-<file path=ppt/slides/slide12.xml><?xml version="1.0" encoding="utf-8"?>
+<file path=ppt/slides/slide11.xml><?xml version="1.0" encoding="utf-8"?>
 <p:sld xmlns:a="http://schemas.openxmlformats.org/drawingml/2006/main" xmlns:r="http://schemas.openxmlformats.org/officeDocument/2006/relationships" xmlns:p="http://schemas.openxmlformats.org/presentationml/2006/main">
   <p:cSld>
     <p:bg>
@@ -5910,7 +5580,7 @@
 </p:sld>
 </file>
 
-<file path=ppt/slides/slide13.xml><?xml version="1.0" encoding="utf-8"?>
+<file path=ppt/slides/slide12.xml><?xml version="1.0" encoding="utf-8"?>
 <p:sld xmlns:a="http://schemas.openxmlformats.org/drawingml/2006/main" xmlns:r="http://schemas.openxmlformats.org/officeDocument/2006/relationships" xmlns:p="http://schemas.openxmlformats.org/presentationml/2006/main">
   <p:cSld>
     <p:bg>
@@ -6798,7 +6468,7 @@
 </p:sld>
 </file>
 
-<file path=ppt/slides/slide14.xml><?xml version="1.0" encoding="utf-8"?>
+<file path=ppt/slides/slide13.xml><?xml version="1.0" encoding="utf-8"?>
 <p:sld xmlns:a="http://schemas.openxmlformats.org/drawingml/2006/main" xmlns:r="http://schemas.openxmlformats.org/officeDocument/2006/relationships" xmlns:p="http://schemas.openxmlformats.org/presentationml/2006/main">
   <p:cSld>
     <p:bg>
@@ -6998,14 +6668,14 @@
           <p:nvPr>
             <p:extLst>
               <p:ext uri="{D42A27DB-BD31-4B8C-83A1-F6EECF244321}">
-                <p14:modId xmlns:p14="http://schemas.microsoft.com/office/powerpoint/2010/main" val="2622970614"/>
+                <p14:modId xmlns:p14="http://schemas.microsoft.com/office/powerpoint/2010/main" val="215340697"/>
               </p:ext>
             </p:extLst>
           </p:nvPr>
         </p:nvGraphicFramePr>
         <p:xfrm>
           <a:off x="3212123" y="1572660"/>
-          <a:ext cx="7580922" cy="4379697"/>
+          <a:ext cx="7580922" cy="4356384"/>
         </p:xfrm>
         <a:graphic>
           <a:graphicData uri="http://schemas.openxmlformats.org/drawingml/2006/table">
@@ -8589,7 +8259,7 @@
                   </a:ext>
                 </a:extLst>
               </a:tr>
-              <a:tr h="633144">
+              <a:tr h="609831">
                 <a:tc>
                   <a:txBody>
                     <a:bodyPr/>
@@ -9233,8 +8903,8 @@
         </p:nvSpPr>
         <p:spPr>
           <a:xfrm>
-            <a:off x="685800" y="795528"/>
-            <a:ext cx="6096000" cy="461665"/>
+            <a:off x="685800" y="657028"/>
+            <a:ext cx="6096000" cy="646331"/>
           </a:xfrm>
           <a:prstGeom prst="rect">
             <a:avLst/>
@@ -9248,12 +8918,227 @@
           <a:lstStyle/>
           <a:p>
             <a:r>
-              <a:rPr lang="de-DE" sz="2400" dirty="0"/>
+              <a:rPr lang="de-DE" sz="3600" dirty="0"/>
               <a:t>Produktleistungsprofil</a:t>
             </a:r>
           </a:p>
         </p:txBody>
       </p:sp>
+      <p:cxnSp>
+        <p:nvCxnSpPr>
+          <p:cNvPr id="56" name="Gerader Verbinder 55">
+            <a:extLst>
+              <a:ext uri="{FF2B5EF4-FFF2-40B4-BE49-F238E27FC236}">
+                <a16:creationId xmlns:a16="http://schemas.microsoft.com/office/drawing/2014/main" id="{0930BF53-ED89-4708-B4EA-B2F1F0E13D34}"/>
+              </a:ext>
+            </a:extLst>
+          </p:cNvPr>
+          <p:cNvCxnSpPr>
+            <a:cxnSpLocks/>
+          </p:cNvCxnSpPr>
+          <p:nvPr/>
+        </p:nvCxnSpPr>
+        <p:spPr>
+          <a:xfrm flipV="1">
+            <a:off x="5522259" y="2068606"/>
+            <a:ext cx="1806388" cy="459441"/>
+          </a:xfrm>
+          <a:prstGeom prst="line">
+            <a:avLst/>
+          </a:prstGeom>
+          <a:ln>
+            <a:solidFill>
+              <a:srgbClr val="FF0000"/>
+            </a:solidFill>
+          </a:ln>
+        </p:spPr>
+        <p:style>
+          <a:lnRef idx="1">
+            <a:schemeClr val="accent2"/>
+          </a:lnRef>
+          <a:fillRef idx="0">
+            <a:schemeClr val="accent2"/>
+          </a:fillRef>
+          <a:effectRef idx="0">
+            <a:schemeClr val="accent2"/>
+          </a:effectRef>
+          <a:fontRef idx="minor">
+            <a:schemeClr val="tx1"/>
+          </a:fontRef>
+        </p:style>
+      </p:cxnSp>
+      <p:cxnSp>
+        <p:nvCxnSpPr>
+          <p:cNvPr id="59" name="Gerader Verbinder 58">
+            <a:extLst>
+              <a:ext uri="{FF2B5EF4-FFF2-40B4-BE49-F238E27FC236}">
+                <a16:creationId xmlns:a16="http://schemas.microsoft.com/office/drawing/2014/main" id="{720249DD-C59E-42BF-B52C-078C46485CBD}"/>
+              </a:ext>
+            </a:extLst>
+          </p:cNvPr>
+          <p:cNvCxnSpPr>
+            <a:cxnSpLocks/>
+          </p:cNvCxnSpPr>
+          <p:nvPr/>
+        </p:nvCxnSpPr>
+        <p:spPr>
+          <a:xfrm>
+            <a:off x="5522259" y="2725270"/>
+            <a:ext cx="3715080" cy="599514"/>
+          </a:xfrm>
+          <a:prstGeom prst="line">
+            <a:avLst/>
+          </a:prstGeom>
+          <a:ln>
+            <a:solidFill>
+              <a:srgbClr val="FF0000"/>
+            </a:solidFill>
+          </a:ln>
+        </p:spPr>
+        <p:style>
+          <a:lnRef idx="1">
+            <a:schemeClr val="accent2"/>
+          </a:lnRef>
+          <a:fillRef idx="0">
+            <a:schemeClr val="accent2"/>
+          </a:fillRef>
+          <a:effectRef idx="0">
+            <a:schemeClr val="accent2"/>
+          </a:effectRef>
+          <a:fontRef idx="minor">
+            <a:schemeClr val="tx1"/>
+          </a:fontRef>
+        </p:style>
+      </p:cxnSp>
+      <p:cxnSp>
+        <p:nvCxnSpPr>
+          <p:cNvPr id="62" name="Gerader Verbinder 61">
+            <a:extLst>
+              <a:ext uri="{FF2B5EF4-FFF2-40B4-BE49-F238E27FC236}">
+                <a16:creationId xmlns:a16="http://schemas.microsoft.com/office/drawing/2014/main" id="{372A922A-02F9-49D5-8982-B524EB08F0AE}"/>
+              </a:ext>
+            </a:extLst>
+          </p:cNvPr>
+          <p:cNvCxnSpPr>
+            <a:cxnSpLocks/>
+          </p:cNvCxnSpPr>
+          <p:nvPr/>
+        </p:nvCxnSpPr>
+        <p:spPr>
+          <a:xfrm flipV="1">
+            <a:off x="7386918" y="3562350"/>
+            <a:ext cx="1850421" cy="489697"/>
+          </a:xfrm>
+          <a:prstGeom prst="line">
+            <a:avLst/>
+          </a:prstGeom>
+          <a:ln>
+            <a:solidFill>
+              <a:srgbClr val="FF0000"/>
+            </a:solidFill>
+          </a:ln>
+        </p:spPr>
+        <p:style>
+          <a:lnRef idx="1">
+            <a:schemeClr val="accent2"/>
+          </a:lnRef>
+          <a:fillRef idx="0">
+            <a:schemeClr val="accent2"/>
+          </a:fillRef>
+          <a:effectRef idx="0">
+            <a:schemeClr val="accent2"/>
+          </a:effectRef>
+          <a:fontRef idx="minor">
+            <a:schemeClr val="tx1"/>
+          </a:fontRef>
+        </p:style>
+      </p:cxnSp>
+      <p:cxnSp>
+        <p:nvCxnSpPr>
+          <p:cNvPr id="65" name="Gerader Verbinder 64">
+            <a:extLst>
+              <a:ext uri="{FF2B5EF4-FFF2-40B4-BE49-F238E27FC236}">
+                <a16:creationId xmlns:a16="http://schemas.microsoft.com/office/drawing/2014/main" id="{6D10E1FC-CFAA-4C2E-BD55-B62860D31637}"/>
+              </a:ext>
+            </a:extLst>
+          </p:cNvPr>
+          <p:cNvCxnSpPr>
+            <a:cxnSpLocks/>
+          </p:cNvCxnSpPr>
+          <p:nvPr/>
+        </p:nvCxnSpPr>
+        <p:spPr>
+          <a:xfrm>
+            <a:off x="7295387" y="4258237"/>
+            <a:ext cx="0" cy="421339"/>
+          </a:xfrm>
+          <a:prstGeom prst="line">
+            <a:avLst/>
+          </a:prstGeom>
+          <a:ln>
+            <a:solidFill>
+              <a:srgbClr val="FF0000"/>
+            </a:solidFill>
+          </a:ln>
+        </p:spPr>
+        <p:style>
+          <a:lnRef idx="1">
+            <a:schemeClr val="accent2"/>
+          </a:lnRef>
+          <a:fillRef idx="0">
+            <a:schemeClr val="accent2"/>
+          </a:fillRef>
+          <a:effectRef idx="0">
+            <a:schemeClr val="accent2"/>
+          </a:effectRef>
+          <a:fontRef idx="minor">
+            <a:schemeClr val="tx1"/>
+          </a:fontRef>
+        </p:style>
+      </p:cxnSp>
+      <p:cxnSp>
+        <p:nvCxnSpPr>
+          <p:cNvPr id="67" name="Gerader Verbinder 66">
+            <a:extLst>
+              <a:ext uri="{FF2B5EF4-FFF2-40B4-BE49-F238E27FC236}">
+                <a16:creationId xmlns:a16="http://schemas.microsoft.com/office/drawing/2014/main" id="{3CD27032-F2E7-46CC-A34A-0A6F90A4F31C}"/>
+              </a:ext>
+            </a:extLst>
+          </p:cNvPr>
+          <p:cNvCxnSpPr>
+            <a:cxnSpLocks/>
+          </p:cNvCxnSpPr>
+          <p:nvPr/>
+        </p:nvCxnSpPr>
+        <p:spPr>
+          <a:xfrm>
+            <a:off x="7295387" y="4917142"/>
+            <a:ext cx="1941952" cy="368198"/>
+          </a:xfrm>
+          <a:prstGeom prst="line">
+            <a:avLst/>
+          </a:prstGeom>
+          <a:ln>
+            <a:solidFill>
+              <a:srgbClr val="FF0000"/>
+            </a:solidFill>
+          </a:ln>
+        </p:spPr>
+        <p:style>
+          <a:lnRef idx="1">
+            <a:schemeClr val="accent2"/>
+          </a:lnRef>
+          <a:fillRef idx="0">
+            <a:schemeClr val="accent2"/>
+          </a:fillRef>
+          <a:effectRef idx="0">
+            <a:schemeClr val="accent2"/>
+          </a:effectRef>
+          <a:fontRef idx="minor">
+            <a:schemeClr val="tx1"/>
+          </a:fontRef>
+        </p:style>
+      </p:cxnSp>
     </p:spTree>
     <p:extLst>
       <p:ext uri="{BB962C8B-B14F-4D97-AF65-F5344CB8AC3E}">
@@ -9267,7 +9152,7 @@
 </p:sld>
 </file>
 
-<file path=ppt/slides/slide15.xml><?xml version="1.0" encoding="utf-8"?>
+<file path=ppt/slides/slide14.xml><?xml version="1.0" encoding="utf-8"?>
 <p:sld xmlns:a="http://schemas.openxmlformats.org/drawingml/2006/main" xmlns:r="http://schemas.openxmlformats.org/officeDocument/2006/relationships" xmlns:p="http://schemas.openxmlformats.org/presentationml/2006/main">
   <p:cSld>
     <p:bg>
@@ -9352,7 +9237,7 @@
           <a:graphicData uri="http://schemas.openxmlformats.org/presentationml/2006/ole">
             <mc:AlternateContent xmlns:mc="http://schemas.openxmlformats.org/markup-compatibility/2006">
               <mc:Choice xmlns:v="urn:schemas-microsoft-com:vml" Requires="v">
-                <p:oleObj spid="_x0000_s3084" name="Acrobat Document" r:id="rId3" imgW="4533723" imgH="6415677" progId="AcroExch.Document.DC">
+                <p:oleObj spid="_x0000_s3088" name="Acrobat Document" r:id="rId3" imgW="4533723" imgH="6415677" progId="AcroExch.Document.DC">
                   <p:embed/>
                 </p:oleObj>
               </mc:Choice>
@@ -9435,7 +9320,7 @@
 </p:sld>
 </file>
 
-<file path=ppt/slides/slide16.xml><?xml version="1.0" encoding="utf-8"?>
+<file path=ppt/slides/slide15.xml><?xml version="1.0" encoding="utf-8"?>
 <p:sld xmlns:a="http://schemas.openxmlformats.org/drawingml/2006/main" xmlns:r="http://schemas.openxmlformats.org/officeDocument/2006/relationships" xmlns:p="http://schemas.openxmlformats.org/presentationml/2006/main">
   <p:cSld>
     <p:bg>
@@ -9622,10 +9507,10 @@
       </p:sp>
       <p:pic>
         <p:nvPicPr>
-          <p:cNvPr id="3" name="Grafik 2">
+          <p:cNvPr id="5" name="Grafik 4">
             <a:extLst>
               <a:ext uri="{FF2B5EF4-FFF2-40B4-BE49-F238E27FC236}">
-                <a16:creationId xmlns:a16="http://schemas.microsoft.com/office/drawing/2014/main" id="{DA5F0F5E-B04C-41F7-B2C0-EEB52A279956}"/>
+                <a16:creationId xmlns:a16="http://schemas.microsoft.com/office/drawing/2014/main" id="{27688997-D297-4FB3-A44E-18FF72DFD554}"/>
               </a:ext>
             </a:extLst>
           </p:cNvPr>
@@ -9642,14 +9527,49 @@
         </p:blipFill>
         <p:spPr>
           <a:xfrm>
-            <a:off x="2747962" y="1443037"/>
-            <a:ext cx="6696075" cy="3971925"/>
+            <a:off x="2104298" y="1464188"/>
+            <a:ext cx="7983403" cy="4813071"/>
           </a:xfrm>
           <a:prstGeom prst="rect">
             <a:avLst/>
           </a:prstGeom>
         </p:spPr>
       </p:pic>
+      <p:sp>
+        <p:nvSpPr>
+          <p:cNvPr id="6" name="Textfeld 5">
+            <a:extLst>
+              <a:ext uri="{FF2B5EF4-FFF2-40B4-BE49-F238E27FC236}">
+                <a16:creationId xmlns:a16="http://schemas.microsoft.com/office/drawing/2014/main" id="{49CBC7B0-6724-4729-9107-59C9AADBB25D}"/>
+              </a:ext>
+            </a:extLst>
+          </p:cNvPr>
+          <p:cNvSpPr txBox="1"/>
+          <p:nvPr/>
+        </p:nvSpPr>
+        <p:spPr>
+          <a:xfrm>
+            <a:off x="870531" y="657028"/>
+            <a:ext cx="3343835" cy="646331"/>
+          </a:xfrm>
+          <a:prstGeom prst="rect">
+            <a:avLst/>
+          </a:prstGeom>
+          <a:noFill/>
+        </p:spPr>
+        <p:txBody>
+          <a:bodyPr wrap="square" rtlCol="0">
+            <a:spAutoFit/>
+          </a:bodyPr>
+          <a:lstStyle/>
+          <a:p>
+            <a:r>
+              <a:rPr lang="de-DE" sz="3600" dirty="0"/>
+              <a:t>SWOT - Analyse</a:t>
+            </a:r>
+          </a:p>
+        </p:txBody>
+      </p:sp>
     </p:spTree>
     <p:extLst>
       <p:ext uri="{BB962C8B-B14F-4D97-AF65-F5344CB8AC3E}">
@@ -9663,7 +9583,7 @@
 </p:sld>
 </file>
 
-<file path=ppt/slides/slide17.xml><?xml version="1.0" encoding="utf-8"?>
+<file path=ppt/slides/slide16.xml><?xml version="1.0" encoding="utf-8"?>
 <p:sld xmlns:a="http://schemas.openxmlformats.org/drawingml/2006/main" xmlns:r="http://schemas.openxmlformats.org/officeDocument/2006/relationships" xmlns:p="http://schemas.openxmlformats.org/presentationml/2006/main">
   <p:cSld>
     <p:bg>
@@ -9926,7 +9846,7 @@
 </p:sld>
 </file>
 
-<file path=ppt/slides/slide18.xml><?xml version="1.0" encoding="utf-8"?>
+<file path=ppt/slides/slide17.xml><?xml version="1.0" encoding="utf-8"?>
 <p:sld xmlns:a="http://schemas.openxmlformats.org/drawingml/2006/main" xmlns:r="http://schemas.openxmlformats.org/officeDocument/2006/relationships" xmlns:p="http://schemas.openxmlformats.org/presentationml/2006/main">
   <p:cSld>
     <p:bg>
@@ -10125,8 +10045,8 @@
         </p:nvSpPr>
         <p:spPr>
           <a:xfrm>
-            <a:off x="1350818" y="1164860"/>
-            <a:ext cx="4083627" cy="369332"/>
+            <a:off x="870531" y="1022511"/>
+            <a:ext cx="6084765" cy="646331"/>
           </a:xfrm>
           <a:prstGeom prst="rect">
             <a:avLst/>
@@ -10140,12 +10060,42 @@
           <a:lstStyle/>
           <a:p>
             <a:r>
-              <a:rPr lang="de-DE" dirty="0"/>
-              <a:t>Szenarien</a:t>
+              <a:rPr lang="de-DE" sz="3600" dirty="0"/>
+              <a:t>Überprüfung auf Konsistenz</a:t>
             </a:r>
           </a:p>
         </p:txBody>
       </p:sp>
+      <p:pic>
+        <p:nvPicPr>
+          <p:cNvPr id="5" name="Grafik 4">
+            <a:extLst>
+              <a:ext uri="{FF2B5EF4-FFF2-40B4-BE49-F238E27FC236}">
+                <a16:creationId xmlns:a16="http://schemas.microsoft.com/office/drawing/2014/main" id="{976C5725-30B5-4556-A912-62EF76E9C8F2}"/>
+              </a:ext>
+            </a:extLst>
+          </p:cNvPr>
+          <p:cNvPicPr>
+            <a:picLocks noChangeAspect="1"/>
+          </p:cNvPicPr>
+          <p:nvPr/>
+        </p:nvPicPr>
+        <p:blipFill>
+          <a:blip r:embed="rId2"/>
+          <a:stretch>
+            <a:fillRect/>
+          </a:stretch>
+        </p:blipFill>
+        <p:spPr>
+          <a:xfrm>
+            <a:off x="620486" y="2094687"/>
+            <a:ext cx="10951028" cy="2668626"/>
+          </a:xfrm>
+          <a:prstGeom prst="rect">
+            <a:avLst/>
+          </a:prstGeom>
+        </p:spPr>
+      </p:pic>
     </p:spTree>
     <p:extLst>
       <p:ext uri="{BB962C8B-B14F-4D97-AF65-F5344CB8AC3E}">
@@ -10159,7 +10109,7 @@
 </p:sld>
 </file>
 
-<file path=ppt/slides/slide19.xml><?xml version="1.0" encoding="utf-8"?>
+<file path=ppt/slides/slide18.xml><?xml version="1.0" encoding="utf-8"?>
 <p:sld xmlns:a="http://schemas.openxmlformats.org/drawingml/2006/main" xmlns:r="http://schemas.openxmlformats.org/officeDocument/2006/relationships" xmlns:p="http://schemas.openxmlformats.org/presentationml/2006/main">
   <p:cSld>
     <p:bg>
@@ -10366,8 +10316,8 @@
         </p:blipFill>
         <p:spPr>
           <a:xfrm>
-            <a:off x="1100137" y="100012"/>
-            <a:ext cx="9991725" cy="6657975"/>
+            <a:off x="1734218" y="522532"/>
+            <a:ext cx="8723563" cy="5812936"/>
           </a:xfrm>
           <a:prstGeom prst="rect">
             <a:avLst/>
@@ -10387,81 +10337,7 @@
 </p:sld>
 </file>
 
-<file path=ppt/slides/slide2.xml><?xml version="1.0" encoding="utf-8"?>
-<p:sld xmlns:a="http://schemas.openxmlformats.org/drawingml/2006/main" xmlns:r="http://schemas.openxmlformats.org/officeDocument/2006/relationships" xmlns:p="http://schemas.openxmlformats.org/presentationml/2006/main" showMasterSp="0">
-  <p:cSld>
-    <p:bg>
-      <p:bgPr>
-        <a:solidFill>
-          <a:srgbClr val="4960A6"/>
-        </a:solidFill>
-        <a:effectLst/>
-      </p:bgPr>
-    </p:bg>
-    <p:spTree>
-      <p:nvGrpSpPr>
-        <p:cNvPr id="1" name=""/>
-        <p:cNvGrpSpPr/>
-        <p:nvPr/>
-      </p:nvGrpSpPr>
-      <p:grpSpPr>
-        <a:xfrm>
-          <a:off x="0" y="0"/>
-          <a:ext cx="0" cy="0"/>
-          <a:chOff x="0" y="0"/>
-          <a:chExt cx="0" cy="0"/>
-        </a:xfrm>
-      </p:grpSpPr>
-      <p:pic>
-        <p:nvPicPr>
-          <p:cNvPr id="3" name="Grafik 2">
-            <a:extLst>
-              <a:ext uri="{FF2B5EF4-FFF2-40B4-BE49-F238E27FC236}">
-                <a16:creationId xmlns:a16="http://schemas.microsoft.com/office/drawing/2014/main" id="{723B6203-3323-4168-A356-6BCF681C60F9}"/>
-              </a:ext>
-            </a:extLst>
-          </p:cNvPr>
-          <p:cNvPicPr>
-            <a:picLocks noChangeAspect="1"/>
-          </p:cNvPicPr>
-          <p:nvPr/>
-        </p:nvPicPr>
-        <p:blipFill>
-          <a:blip r:embed="rId2">
-            <a:extLst>
-              <a:ext uri="{28A0092B-C50C-407E-A947-70E740481C1C}">
-                <a14:useLocalDpi xmlns:a14="http://schemas.microsoft.com/office/drawing/2010/main" val="0"/>
-              </a:ext>
-            </a:extLst>
-          </a:blip>
-          <a:stretch>
-            <a:fillRect/>
-          </a:stretch>
-        </p:blipFill>
-        <p:spPr>
-          <a:xfrm>
-            <a:off x="2667000" y="0"/>
-            <a:ext cx="6858000" cy="6858000"/>
-          </a:xfrm>
-          <a:prstGeom prst="rect">
-            <a:avLst/>
-          </a:prstGeom>
-        </p:spPr>
-      </p:pic>
-    </p:spTree>
-    <p:extLst>
-      <p:ext uri="{BB962C8B-B14F-4D97-AF65-F5344CB8AC3E}">
-        <p14:creationId xmlns:p14="http://schemas.microsoft.com/office/powerpoint/2010/main" val="1849569525"/>
-      </p:ext>
-    </p:extLst>
-  </p:cSld>
-  <p:clrMapOvr>
-    <a:masterClrMapping/>
-  </p:clrMapOvr>
-</p:sld>
-</file>
-
-<file path=ppt/slides/slide20.xml><?xml version="1.0" encoding="utf-8"?>
+<file path=ppt/slides/slide19.xml><?xml version="1.0" encoding="utf-8"?>
 <p:sld xmlns:a="http://schemas.openxmlformats.org/drawingml/2006/main" xmlns:r="http://schemas.openxmlformats.org/officeDocument/2006/relationships" xmlns:p="http://schemas.openxmlformats.org/presentationml/2006/main">
   <p:cSld>
     <p:bg>
@@ -10689,7 +10565,315 @@
 </p:sld>
 </file>
 
-<file path=ppt/slides/slide21.xml><?xml version="1.0" encoding="utf-8"?>
+<file path=ppt/slides/slide2.xml><?xml version="1.0" encoding="utf-8"?>
+<p:sld xmlns:a="http://schemas.openxmlformats.org/drawingml/2006/main" xmlns:r="http://schemas.openxmlformats.org/officeDocument/2006/relationships" xmlns:p="http://schemas.openxmlformats.org/presentationml/2006/main">
+  <p:cSld>
+    <p:bg>
+      <p:bgPr>
+        <a:solidFill>
+          <a:srgbClr val="4960A6"/>
+        </a:solidFill>
+        <a:effectLst/>
+      </p:bgPr>
+    </p:bg>
+    <p:spTree>
+      <p:nvGrpSpPr>
+        <p:cNvPr id="1" name=""/>
+        <p:cNvGrpSpPr/>
+        <p:nvPr/>
+      </p:nvGrpSpPr>
+      <p:grpSpPr>
+        <a:xfrm>
+          <a:off x="0" y="0"/>
+          <a:ext cx="0" cy="0"/>
+          <a:chOff x="0" y="0"/>
+          <a:chExt cx="0" cy="0"/>
+        </a:xfrm>
+      </p:grpSpPr>
+      <p:cxnSp>
+        <p:nvCxnSpPr>
+          <p:cNvPr id="7" name="Straight Connector 6">
+            <a:extLst>
+              <a:ext uri="{FF2B5EF4-FFF2-40B4-BE49-F238E27FC236}">
+                <a16:creationId xmlns:a16="http://schemas.microsoft.com/office/drawing/2014/main" id="{8CED2307-F79F-42F9-B81B-91F768E72BFC}"/>
+              </a:ext>
+              <a:ext uri="{C183D7F6-B498-43B3-948B-1728B52AA6E4}">
+                <adec:decorative xmlns:adec="http://schemas.microsoft.com/office/drawing/2017/decorative" val="1"/>
+              </a:ext>
+            </a:extLst>
+          </p:cNvPr>
+          <p:cNvCxnSpPr>
+            <a:cxnSpLocks noGrp="1" noRot="1" noChangeAspect="1" noMove="1" noResize="1" noEditPoints="1" noAdjustHandles="1" noChangeArrowheads="1" noChangeShapeType="1"/>
+          </p:cNvCxnSpPr>
+          <p:nvPr>
+            <p:extLst>
+              <p:ext uri="{386F3935-93C4-4BCD-93E2-E3B085C9AB24}">
+                <p16:designElem xmlns:p16="http://schemas.microsoft.com/office/powerpoint/2015/main" val="1"/>
+              </p:ext>
+            </p:extLst>
+          </p:nvPr>
+        </p:nvCxnSpPr>
+        <p:spPr>
+          <a:xfrm flipV="1">
+            <a:off x="8386842" y="5264106"/>
+            <a:ext cx="0" cy="914400"/>
+          </a:xfrm>
+          <a:prstGeom prst="line">
+            <a:avLst/>
+          </a:prstGeom>
+          <a:ln w="19050">
+            <a:solidFill>
+              <a:schemeClr val="accent2"/>
+            </a:solidFill>
+          </a:ln>
+        </p:spPr>
+        <p:style>
+          <a:lnRef idx="1">
+            <a:schemeClr val="accent1"/>
+          </a:lnRef>
+          <a:fillRef idx="0">
+            <a:schemeClr val="accent1"/>
+          </a:fillRef>
+          <a:effectRef idx="0">
+            <a:schemeClr val="accent1"/>
+          </a:effectRef>
+          <a:fontRef idx="minor">
+            <a:schemeClr val="tx1"/>
+          </a:fontRef>
+        </p:style>
+      </p:cxnSp>
+      <p:sp>
+        <p:nvSpPr>
+          <p:cNvPr id="9" name="Rectangle 8">
+            <a:extLst>
+              <a:ext uri="{FF2B5EF4-FFF2-40B4-BE49-F238E27FC236}">
+                <a16:creationId xmlns:a16="http://schemas.microsoft.com/office/drawing/2014/main" id="{E5DB38FF-CE38-4D82-B9F2-DFE28A0194E1}"/>
+              </a:ext>
+              <a:ext uri="{C183D7F6-B498-43B3-948B-1728B52AA6E4}">
+                <adec:decorative xmlns:adec="http://schemas.microsoft.com/office/drawing/2017/decorative" val="1"/>
+              </a:ext>
+            </a:extLst>
+          </p:cNvPr>
+          <p:cNvSpPr>
+            <a:spLocks noGrp="1" noRot="1" noChangeAspect="1" noMove="1" noResize="1" noEditPoints="1" noAdjustHandles="1" noChangeArrowheads="1" noChangeShapeType="1" noTextEdit="1"/>
+          </p:cNvSpPr>
+          <p:nvPr>
+            <p:extLst>
+              <p:ext uri="{386F3935-93C4-4BCD-93E2-E3B085C9AB24}">
+                <p16:designElem xmlns:p16="http://schemas.microsoft.com/office/powerpoint/2015/main" val="1"/>
+              </p:ext>
+            </p:extLst>
+          </p:nvPr>
+        </p:nvSpPr>
+        <p:spPr>
+          <a:xfrm>
+            <a:off x="0" y="-1"/>
+            <a:ext cx="12192000" cy="4572001"/>
+          </a:xfrm>
+          <a:prstGeom prst="rect">
+            <a:avLst/>
+          </a:prstGeom>
+          <a:solidFill>
+            <a:schemeClr val="accent2"/>
+          </a:solidFill>
+          <a:ln>
+            <a:noFill/>
+          </a:ln>
+        </p:spPr>
+        <p:style>
+          <a:lnRef idx="2">
+            <a:schemeClr val="accent1">
+              <a:shade val="50000"/>
+            </a:schemeClr>
+          </a:lnRef>
+          <a:fillRef idx="1">
+            <a:schemeClr val="accent1"/>
+          </a:fillRef>
+          <a:effectRef idx="0">
+            <a:schemeClr val="accent1"/>
+          </a:effectRef>
+          <a:fontRef idx="minor">
+            <a:schemeClr val="lt1"/>
+          </a:fontRef>
+        </p:style>
+      </p:sp>
+      <p:sp useBgFill="1">
+        <p:nvSpPr>
+          <p:cNvPr id="11" name="Rectangle 10">
+            <a:extLst>
+              <a:ext uri="{FF2B5EF4-FFF2-40B4-BE49-F238E27FC236}">
+                <a16:creationId xmlns:a16="http://schemas.microsoft.com/office/drawing/2014/main" id="{0BA28970-3E8F-46CD-A302-42EE83668B0A}"/>
+              </a:ext>
+              <a:ext uri="{C183D7F6-B498-43B3-948B-1728B52AA6E4}">
+                <adec:decorative xmlns:adec="http://schemas.microsoft.com/office/drawing/2017/decorative" val="1"/>
+              </a:ext>
+            </a:extLst>
+          </p:cNvPr>
+          <p:cNvSpPr>
+            <a:spLocks noGrp="1" noRot="1" noChangeAspect="1" noMove="1" noResize="1" noEditPoints="1" noAdjustHandles="1" noChangeArrowheads="1" noChangeShapeType="1" noTextEdit="1"/>
+          </p:cNvSpPr>
+          <p:nvPr>
+            <p:extLst>
+              <p:ext uri="{386F3935-93C4-4BCD-93E2-E3B085C9AB24}">
+                <p16:designElem xmlns:p16="http://schemas.microsoft.com/office/powerpoint/2015/main" val="1"/>
+              </p:ext>
+            </p:extLst>
+          </p:nvPr>
+        </p:nvSpPr>
+        <p:spPr>
+          <a:xfrm>
+            <a:off x="0" y="0"/>
+            <a:ext cx="12192000" cy="6858000"/>
+          </a:xfrm>
+          <a:prstGeom prst="rect">
+            <a:avLst/>
+          </a:prstGeom>
+          <a:ln>
+            <a:noFill/>
+          </a:ln>
+        </p:spPr>
+        <p:style>
+          <a:lnRef idx="2">
+            <a:schemeClr val="accent1">
+              <a:shade val="50000"/>
+            </a:schemeClr>
+          </a:lnRef>
+          <a:fillRef idx="1">
+            <a:schemeClr val="accent1"/>
+          </a:fillRef>
+          <a:effectRef idx="0">
+            <a:schemeClr val="accent1"/>
+          </a:effectRef>
+          <a:fontRef idx="minor">
+            <a:schemeClr val="lt1"/>
+          </a:fontRef>
+        </p:style>
+        <p:txBody>
+          <a:bodyPr rtlCol="0" anchor="ctr"/>
+          <a:lstStyle/>
+          <a:p>
+            <a:pPr algn="ctr"/>
+            <a:endParaRPr lang="en-US"/>
+          </a:p>
+        </p:txBody>
+      </p:sp>
+      <p:sp>
+        <p:nvSpPr>
+          <p:cNvPr id="2" name="Titel 1">
+            <a:extLst>
+              <a:ext uri="{FF2B5EF4-FFF2-40B4-BE49-F238E27FC236}">
+                <a16:creationId xmlns:a16="http://schemas.microsoft.com/office/drawing/2014/main" id="{9EE936F0-62E4-40F1-BA06-11DDD134B512}"/>
+              </a:ext>
+            </a:extLst>
+          </p:cNvPr>
+          <p:cNvSpPr>
+            <a:spLocks noGrp="1"/>
+          </p:cNvSpPr>
+          <p:nvPr>
+            <p:ph type="title" idx="4294967295"/>
+          </p:nvPr>
+        </p:nvSpPr>
+        <p:spPr>
+          <a:xfrm>
+            <a:off x="643467" y="643467"/>
+            <a:ext cx="7164674" cy="5571066"/>
+          </a:xfrm>
+        </p:spPr>
+        <p:txBody>
+          <a:bodyPr vert="horz" lIns="91440" tIns="45720" rIns="91440" bIns="45720" rtlCol="0" anchor="ctr">
+            <a:normAutofit/>
+          </a:bodyPr>
+          <a:lstStyle/>
+          <a:p>
+            <a:pPr algn="r"/>
+            <a:r>
+              <a:rPr lang="en-US" sz="6600" spc="200">
+                <a:solidFill>
+                  <a:schemeClr val="tx1">
+                    <a:alpha val="80000"/>
+                  </a:schemeClr>
+                </a:solidFill>
+              </a:rPr>
+              <a:t>Wer sind wir?</a:t>
+            </a:r>
+            <a:endParaRPr lang="en-US" sz="6600" spc="200" dirty="0">
+              <a:solidFill>
+                <a:schemeClr val="tx1">
+                  <a:alpha val="80000"/>
+                </a:schemeClr>
+              </a:solidFill>
+            </a:endParaRPr>
+          </a:p>
+        </p:txBody>
+      </p:sp>
+      <p:cxnSp>
+        <p:nvCxnSpPr>
+          <p:cNvPr id="13" name="Straight Connector 12">
+            <a:extLst>
+              <a:ext uri="{FF2B5EF4-FFF2-40B4-BE49-F238E27FC236}">
+                <a16:creationId xmlns:a16="http://schemas.microsoft.com/office/drawing/2014/main" id="{47AE7893-212D-45CB-A5B0-AE377389AB3F}"/>
+              </a:ext>
+              <a:ext uri="{C183D7F6-B498-43B3-948B-1728B52AA6E4}">
+                <adec:decorative xmlns:adec="http://schemas.microsoft.com/office/drawing/2017/decorative" val="1"/>
+              </a:ext>
+            </a:extLst>
+          </p:cNvPr>
+          <p:cNvCxnSpPr>
+            <a:cxnSpLocks noGrp="1" noRot="1" noChangeAspect="1" noMove="1" noResize="1" noEditPoints="1" noAdjustHandles="1" noChangeArrowheads="1" noChangeShapeType="1"/>
+          </p:cNvCxnSpPr>
+          <p:nvPr>
+            <p:extLst>
+              <p:ext uri="{386F3935-93C4-4BCD-93E2-E3B085C9AB24}">
+                <p16:designElem xmlns:p16="http://schemas.microsoft.com/office/powerpoint/2015/main" val="1"/>
+              </p:ext>
+            </p:extLst>
+          </p:nvPr>
+        </p:nvCxnSpPr>
+        <p:spPr>
+          <a:xfrm>
+            <a:off x="8139605" y="1600200"/>
+            <a:ext cx="0" cy="3657600"/>
+          </a:xfrm>
+          <a:prstGeom prst="line">
+            <a:avLst/>
+          </a:prstGeom>
+          <a:ln w="19050">
+            <a:solidFill>
+              <a:schemeClr val="accent1">
+                <a:lumMod val="75000"/>
+              </a:schemeClr>
+            </a:solidFill>
+          </a:ln>
+        </p:spPr>
+        <p:style>
+          <a:lnRef idx="1">
+            <a:schemeClr val="accent1"/>
+          </a:lnRef>
+          <a:fillRef idx="0">
+            <a:schemeClr val="accent1"/>
+          </a:fillRef>
+          <a:effectRef idx="0">
+            <a:schemeClr val="accent1"/>
+          </a:effectRef>
+          <a:fontRef idx="minor">
+            <a:schemeClr val="tx1"/>
+          </a:fontRef>
+        </p:style>
+      </p:cxnSp>
+    </p:spTree>
+    <p:extLst>
+      <p:ext uri="{BB962C8B-B14F-4D97-AF65-F5344CB8AC3E}">
+        <p14:creationId xmlns:p14="http://schemas.microsoft.com/office/powerpoint/2010/main" val="2522807781"/>
+      </p:ext>
+    </p:extLst>
+  </p:cSld>
+  <p:clrMapOvr>
+    <a:masterClrMapping/>
+  </p:clrMapOvr>
+</p:sld>
+</file>
+
+<file path=ppt/slides/slide20.xml><?xml version="1.0" encoding="utf-8"?>
 <p:sld xmlns:a="http://schemas.openxmlformats.org/drawingml/2006/main" xmlns:r="http://schemas.openxmlformats.org/officeDocument/2006/relationships" xmlns:p="http://schemas.openxmlformats.org/presentationml/2006/main">
   <p:cSld>
     <p:bg>
@@ -10887,7 +11071,7 @@
 </p:sld>
 </file>
 
-<file path=ppt/slides/slide22.xml><?xml version="1.0" encoding="utf-8"?>
+<file path=ppt/slides/slide21.xml><?xml version="1.0" encoding="utf-8"?>
 <p:sld xmlns:a="http://schemas.openxmlformats.org/drawingml/2006/main" xmlns:r="http://schemas.openxmlformats.org/officeDocument/2006/relationships" xmlns:p="http://schemas.openxmlformats.org/presentationml/2006/main">
   <p:cSld>
     <p:bg>
@@ -11251,314 +11435,6 @@
     <p:bg>
       <p:bgPr>
         <a:solidFill>
-          <a:srgbClr val="4960A6"/>
-        </a:solidFill>
-        <a:effectLst/>
-      </p:bgPr>
-    </p:bg>
-    <p:spTree>
-      <p:nvGrpSpPr>
-        <p:cNvPr id="1" name=""/>
-        <p:cNvGrpSpPr/>
-        <p:nvPr/>
-      </p:nvGrpSpPr>
-      <p:grpSpPr>
-        <a:xfrm>
-          <a:off x="0" y="0"/>
-          <a:ext cx="0" cy="0"/>
-          <a:chOff x="0" y="0"/>
-          <a:chExt cx="0" cy="0"/>
-        </a:xfrm>
-      </p:grpSpPr>
-      <p:cxnSp>
-        <p:nvCxnSpPr>
-          <p:cNvPr id="7" name="Straight Connector 6">
-            <a:extLst>
-              <a:ext uri="{FF2B5EF4-FFF2-40B4-BE49-F238E27FC236}">
-                <a16:creationId xmlns:a16="http://schemas.microsoft.com/office/drawing/2014/main" id="{8CED2307-F79F-42F9-B81B-91F768E72BFC}"/>
-              </a:ext>
-              <a:ext uri="{C183D7F6-B498-43B3-948B-1728B52AA6E4}">
-                <adec:decorative xmlns:adec="http://schemas.microsoft.com/office/drawing/2017/decorative" val="1"/>
-              </a:ext>
-            </a:extLst>
-          </p:cNvPr>
-          <p:cNvCxnSpPr>
-            <a:cxnSpLocks noGrp="1" noRot="1" noChangeAspect="1" noMove="1" noResize="1" noEditPoints="1" noAdjustHandles="1" noChangeArrowheads="1" noChangeShapeType="1"/>
-          </p:cNvCxnSpPr>
-          <p:nvPr>
-            <p:extLst>
-              <p:ext uri="{386F3935-93C4-4BCD-93E2-E3B085C9AB24}">
-                <p16:designElem xmlns:p16="http://schemas.microsoft.com/office/powerpoint/2015/main" val="1"/>
-              </p:ext>
-            </p:extLst>
-          </p:nvPr>
-        </p:nvCxnSpPr>
-        <p:spPr>
-          <a:xfrm flipV="1">
-            <a:off x="8386842" y="5264106"/>
-            <a:ext cx="0" cy="914400"/>
-          </a:xfrm>
-          <a:prstGeom prst="line">
-            <a:avLst/>
-          </a:prstGeom>
-          <a:ln w="19050">
-            <a:solidFill>
-              <a:schemeClr val="accent2"/>
-            </a:solidFill>
-          </a:ln>
-        </p:spPr>
-        <p:style>
-          <a:lnRef idx="1">
-            <a:schemeClr val="accent1"/>
-          </a:lnRef>
-          <a:fillRef idx="0">
-            <a:schemeClr val="accent1"/>
-          </a:fillRef>
-          <a:effectRef idx="0">
-            <a:schemeClr val="accent1"/>
-          </a:effectRef>
-          <a:fontRef idx="minor">
-            <a:schemeClr val="tx1"/>
-          </a:fontRef>
-        </p:style>
-      </p:cxnSp>
-      <p:sp>
-        <p:nvSpPr>
-          <p:cNvPr id="9" name="Rectangle 8">
-            <a:extLst>
-              <a:ext uri="{FF2B5EF4-FFF2-40B4-BE49-F238E27FC236}">
-                <a16:creationId xmlns:a16="http://schemas.microsoft.com/office/drawing/2014/main" id="{E5DB38FF-CE38-4D82-B9F2-DFE28A0194E1}"/>
-              </a:ext>
-              <a:ext uri="{C183D7F6-B498-43B3-948B-1728B52AA6E4}">
-                <adec:decorative xmlns:adec="http://schemas.microsoft.com/office/drawing/2017/decorative" val="1"/>
-              </a:ext>
-            </a:extLst>
-          </p:cNvPr>
-          <p:cNvSpPr>
-            <a:spLocks noGrp="1" noRot="1" noChangeAspect="1" noMove="1" noResize="1" noEditPoints="1" noAdjustHandles="1" noChangeArrowheads="1" noChangeShapeType="1" noTextEdit="1"/>
-          </p:cNvSpPr>
-          <p:nvPr>
-            <p:extLst>
-              <p:ext uri="{386F3935-93C4-4BCD-93E2-E3B085C9AB24}">
-                <p16:designElem xmlns:p16="http://schemas.microsoft.com/office/powerpoint/2015/main" val="1"/>
-              </p:ext>
-            </p:extLst>
-          </p:nvPr>
-        </p:nvSpPr>
-        <p:spPr>
-          <a:xfrm>
-            <a:off x="0" y="-1"/>
-            <a:ext cx="12192000" cy="4572001"/>
-          </a:xfrm>
-          <a:prstGeom prst="rect">
-            <a:avLst/>
-          </a:prstGeom>
-          <a:solidFill>
-            <a:schemeClr val="accent2"/>
-          </a:solidFill>
-          <a:ln>
-            <a:noFill/>
-          </a:ln>
-        </p:spPr>
-        <p:style>
-          <a:lnRef idx="2">
-            <a:schemeClr val="accent1">
-              <a:shade val="50000"/>
-            </a:schemeClr>
-          </a:lnRef>
-          <a:fillRef idx="1">
-            <a:schemeClr val="accent1"/>
-          </a:fillRef>
-          <a:effectRef idx="0">
-            <a:schemeClr val="accent1"/>
-          </a:effectRef>
-          <a:fontRef idx="minor">
-            <a:schemeClr val="lt1"/>
-          </a:fontRef>
-        </p:style>
-      </p:sp>
-      <p:sp useBgFill="1">
-        <p:nvSpPr>
-          <p:cNvPr id="11" name="Rectangle 10">
-            <a:extLst>
-              <a:ext uri="{FF2B5EF4-FFF2-40B4-BE49-F238E27FC236}">
-                <a16:creationId xmlns:a16="http://schemas.microsoft.com/office/drawing/2014/main" id="{0BA28970-3E8F-46CD-A302-42EE83668B0A}"/>
-              </a:ext>
-              <a:ext uri="{C183D7F6-B498-43B3-948B-1728B52AA6E4}">
-                <adec:decorative xmlns:adec="http://schemas.microsoft.com/office/drawing/2017/decorative" val="1"/>
-              </a:ext>
-            </a:extLst>
-          </p:cNvPr>
-          <p:cNvSpPr>
-            <a:spLocks noGrp="1" noRot="1" noChangeAspect="1" noMove="1" noResize="1" noEditPoints="1" noAdjustHandles="1" noChangeArrowheads="1" noChangeShapeType="1" noTextEdit="1"/>
-          </p:cNvSpPr>
-          <p:nvPr>
-            <p:extLst>
-              <p:ext uri="{386F3935-93C4-4BCD-93E2-E3B085C9AB24}">
-                <p16:designElem xmlns:p16="http://schemas.microsoft.com/office/powerpoint/2015/main" val="1"/>
-              </p:ext>
-            </p:extLst>
-          </p:nvPr>
-        </p:nvSpPr>
-        <p:spPr>
-          <a:xfrm>
-            <a:off x="0" y="0"/>
-            <a:ext cx="12192000" cy="6858000"/>
-          </a:xfrm>
-          <a:prstGeom prst="rect">
-            <a:avLst/>
-          </a:prstGeom>
-          <a:ln>
-            <a:noFill/>
-          </a:ln>
-        </p:spPr>
-        <p:style>
-          <a:lnRef idx="2">
-            <a:schemeClr val="accent1">
-              <a:shade val="50000"/>
-            </a:schemeClr>
-          </a:lnRef>
-          <a:fillRef idx="1">
-            <a:schemeClr val="accent1"/>
-          </a:fillRef>
-          <a:effectRef idx="0">
-            <a:schemeClr val="accent1"/>
-          </a:effectRef>
-          <a:fontRef idx="minor">
-            <a:schemeClr val="lt1"/>
-          </a:fontRef>
-        </p:style>
-        <p:txBody>
-          <a:bodyPr rtlCol="0" anchor="ctr"/>
-          <a:lstStyle/>
-          <a:p>
-            <a:pPr algn="ctr"/>
-            <a:endParaRPr lang="en-US"/>
-          </a:p>
-        </p:txBody>
-      </p:sp>
-      <p:sp>
-        <p:nvSpPr>
-          <p:cNvPr id="2" name="Titel 1">
-            <a:extLst>
-              <a:ext uri="{FF2B5EF4-FFF2-40B4-BE49-F238E27FC236}">
-                <a16:creationId xmlns:a16="http://schemas.microsoft.com/office/drawing/2014/main" id="{9EE936F0-62E4-40F1-BA06-11DDD134B512}"/>
-              </a:ext>
-            </a:extLst>
-          </p:cNvPr>
-          <p:cNvSpPr>
-            <a:spLocks noGrp="1"/>
-          </p:cNvSpPr>
-          <p:nvPr>
-            <p:ph type="title" idx="4294967295"/>
-          </p:nvPr>
-        </p:nvSpPr>
-        <p:spPr>
-          <a:xfrm>
-            <a:off x="643467" y="643467"/>
-            <a:ext cx="7164674" cy="5571066"/>
-          </a:xfrm>
-        </p:spPr>
-        <p:txBody>
-          <a:bodyPr vert="horz" lIns="91440" tIns="45720" rIns="91440" bIns="45720" rtlCol="0" anchor="ctr">
-            <a:normAutofit/>
-          </a:bodyPr>
-          <a:lstStyle/>
-          <a:p>
-            <a:pPr algn="r"/>
-            <a:r>
-              <a:rPr lang="en-US" sz="6600" spc="200">
-                <a:solidFill>
-                  <a:schemeClr val="tx1">
-                    <a:alpha val="80000"/>
-                  </a:schemeClr>
-                </a:solidFill>
-              </a:rPr>
-              <a:t>Wer sind wir?</a:t>
-            </a:r>
-            <a:endParaRPr lang="en-US" sz="6600" spc="200" dirty="0">
-              <a:solidFill>
-                <a:schemeClr val="tx1">
-                  <a:alpha val="80000"/>
-                </a:schemeClr>
-              </a:solidFill>
-            </a:endParaRPr>
-          </a:p>
-        </p:txBody>
-      </p:sp>
-      <p:cxnSp>
-        <p:nvCxnSpPr>
-          <p:cNvPr id="13" name="Straight Connector 12">
-            <a:extLst>
-              <a:ext uri="{FF2B5EF4-FFF2-40B4-BE49-F238E27FC236}">
-                <a16:creationId xmlns:a16="http://schemas.microsoft.com/office/drawing/2014/main" id="{47AE7893-212D-45CB-A5B0-AE377389AB3F}"/>
-              </a:ext>
-              <a:ext uri="{C183D7F6-B498-43B3-948B-1728B52AA6E4}">
-                <adec:decorative xmlns:adec="http://schemas.microsoft.com/office/drawing/2017/decorative" val="1"/>
-              </a:ext>
-            </a:extLst>
-          </p:cNvPr>
-          <p:cNvCxnSpPr>
-            <a:cxnSpLocks noGrp="1" noRot="1" noChangeAspect="1" noMove="1" noResize="1" noEditPoints="1" noAdjustHandles="1" noChangeArrowheads="1" noChangeShapeType="1"/>
-          </p:cNvCxnSpPr>
-          <p:nvPr>
-            <p:extLst>
-              <p:ext uri="{386F3935-93C4-4BCD-93E2-E3B085C9AB24}">
-                <p16:designElem xmlns:p16="http://schemas.microsoft.com/office/powerpoint/2015/main" val="1"/>
-              </p:ext>
-            </p:extLst>
-          </p:nvPr>
-        </p:nvCxnSpPr>
-        <p:spPr>
-          <a:xfrm>
-            <a:off x="8139605" y="1600200"/>
-            <a:ext cx="0" cy="3657600"/>
-          </a:xfrm>
-          <a:prstGeom prst="line">
-            <a:avLst/>
-          </a:prstGeom>
-          <a:ln w="19050">
-            <a:solidFill>
-              <a:schemeClr val="accent1">
-                <a:lumMod val="75000"/>
-              </a:schemeClr>
-            </a:solidFill>
-          </a:ln>
-        </p:spPr>
-        <p:style>
-          <a:lnRef idx="1">
-            <a:schemeClr val="accent1"/>
-          </a:lnRef>
-          <a:fillRef idx="0">
-            <a:schemeClr val="accent1"/>
-          </a:fillRef>
-          <a:effectRef idx="0">
-            <a:schemeClr val="accent1"/>
-          </a:effectRef>
-          <a:fontRef idx="minor">
-            <a:schemeClr val="tx1"/>
-          </a:fontRef>
-        </p:style>
-      </p:cxnSp>
-    </p:spTree>
-    <p:extLst>
-      <p:ext uri="{BB962C8B-B14F-4D97-AF65-F5344CB8AC3E}">
-        <p14:creationId xmlns:p14="http://schemas.microsoft.com/office/powerpoint/2010/main" val="2522807781"/>
-      </p:ext>
-    </p:extLst>
-  </p:cSld>
-  <p:clrMapOvr>
-    <a:masterClrMapping/>
-  </p:clrMapOvr>
-</p:sld>
-</file>
-
-<file path=ppt/slides/slide4.xml><?xml version="1.0" encoding="utf-8"?>
-<p:sld xmlns:a="http://schemas.openxmlformats.org/drawingml/2006/main" xmlns:r="http://schemas.openxmlformats.org/officeDocument/2006/relationships" xmlns:p="http://schemas.openxmlformats.org/presentationml/2006/main">
-  <p:cSld>
-    <p:bg>
-      <p:bgPr>
-        <a:solidFill>
           <a:srgbClr val="C17F63"/>
         </a:solidFill>
         <a:effectLst/>
@@ -11941,7 +11817,7 @@
 </p:sld>
 </file>
 
-<file path=ppt/slides/slide5.xml><?xml version="1.0" encoding="utf-8"?>
+<file path=ppt/slides/slide4.xml><?xml version="1.0" encoding="utf-8"?>
 <p:sld xmlns:a="http://schemas.openxmlformats.org/drawingml/2006/main" xmlns:r="http://schemas.openxmlformats.org/officeDocument/2006/relationships" xmlns:p="http://schemas.openxmlformats.org/presentationml/2006/main">
   <p:cSld>
     <p:bg>
@@ -12282,7 +12158,7 @@
 </p:sld>
 </file>
 
-<file path=ppt/slides/slide6.xml><?xml version="1.0" encoding="utf-8"?>
+<file path=ppt/slides/slide5.xml><?xml version="1.0" encoding="utf-8"?>
 <p:sld xmlns:a="http://schemas.openxmlformats.org/drawingml/2006/main" xmlns:r="http://schemas.openxmlformats.org/officeDocument/2006/relationships" xmlns:p="http://schemas.openxmlformats.org/presentationml/2006/main">
   <p:cSld>
     <p:bg>
@@ -12642,7 +12518,7 @@
 </p:sld>
 </file>
 
-<file path=ppt/slides/slide7.xml><?xml version="1.0" encoding="utf-8"?>
+<file path=ppt/slides/slide6.xml><?xml version="1.0" encoding="utf-8"?>
 <p:sld xmlns:a="http://schemas.openxmlformats.org/drawingml/2006/main" xmlns:r="http://schemas.openxmlformats.org/officeDocument/2006/relationships" xmlns:p="http://schemas.openxmlformats.org/presentationml/2006/main">
   <p:cSld>
     <p:bg>
@@ -13276,7 +13152,7 @@
 </p:sld>
 </file>
 
-<file path=ppt/slides/slide8.xml><?xml version="1.0" encoding="utf-8"?>
+<file path=ppt/slides/slide7.xml><?xml version="1.0" encoding="utf-8"?>
 <p:sld xmlns:a="http://schemas.openxmlformats.org/drawingml/2006/main" xmlns:r="http://schemas.openxmlformats.org/officeDocument/2006/relationships" xmlns:p="http://schemas.openxmlformats.org/presentationml/2006/main">
   <p:cSld>
     <p:bg>
@@ -13486,7 +13362,7 @@
 </p:sld>
 </file>
 
-<file path=ppt/slides/slide9.xml><?xml version="1.0" encoding="utf-8"?>
+<file path=ppt/slides/slide8.xml><?xml version="1.0" encoding="utf-8"?>
 <p:sld xmlns:a="http://schemas.openxmlformats.org/drawingml/2006/main" xmlns:r="http://schemas.openxmlformats.org/officeDocument/2006/relationships" xmlns:p="http://schemas.openxmlformats.org/presentationml/2006/main">
   <p:cSld>
     <p:bg>
@@ -13778,6 +13654,243 @@
     <p:extLst>
       <p:ext uri="{BB962C8B-B14F-4D97-AF65-F5344CB8AC3E}">
         <p14:creationId xmlns:p14="http://schemas.microsoft.com/office/powerpoint/2010/main" val="3404392292"/>
+      </p:ext>
+    </p:extLst>
+  </p:cSld>
+  <p:clrMapOvr>
+    <a:masterClrMapping/>
+  </p:clrMapOvr>
+</p:sld>
+</file>
+
+<file path=ppt/slides/slide9.xml><?xml version="1.0" encoding="utf-8"?>
+<p:sld xmlns:a="http://schemas.openxmlformats.org/drawingml/2006/main" xmlns:r="http://schemas.openxmlformats.org/officeDocument/2006/relationships" xmlns:p="http://schemas.openxmlformats.org/presentationml/2006/main">
+  <p:cSld>
+    <p:bg>
+      <p:bgPr>
+        <a:solidFill>
+          <a:srgbClr val="4960A6"/>
+        </a:solidFill>
+        <a:effectLst/>
+      </p:bgPr>
+    </p:bg>
+    <p:spTree>
+      <p:nvGrpSpPr>
+        <p:cNvPr id="1" name=""/>
+        <p:cNvGrpSpPr/>
+        <p:nvPr/>
+      </p:nvGrpSpPr>
+      <p:grpSpPr>
+        <a:xfrm>
+          <a:off x="0" y="0"/>
+          <a:ext cx="0" cy="0"/>
+          <a:chOff x="0" y="0"/>
+          <a:chExt cx="0" cy="0"/>
+        </a:xfrm>
+      </p:grpSpPr>
+      <p:sp>
+        <p:nvSpPr>
+          <p:cNvPr id="22" name="Rectangle 21">
+            <a:extLst>
+              <a:ext uri="{FF2B5EF4-FFF2-40B4-BE49-F238E27FC236}">
+                <a16:creationId xmlns:a16="http://schemas.microsoft.com/office/drawing/2014/main" id="{44B3F5F5-166C-4694-B20A-3F8218AF7D03}"/>
+              </a:ext>
+              <a:ext uri="{C183D7F6-B498-43B3-948B-1728B52AA6E4}">
+                <adec:decorative xmlns:adec="http://schemas.microsoft.com/office/drawing/2017/decorative" val="1"/>
+              </a:ext>
+            </a:extLst>
+          </p:cNvPr>
+          <p:cNvSpPr>
+            <a:spLocks noGrp="1" noRot="1" noChangeAspect="1" noMove="1" noResize="1" noEditPoints="1" noAdjustHandles="1" noChangeArrowheads="1" noChangeShapeType="1" noTextEdit="1"/>
+          </p:cNvSpPr>
+          <p:nvPr>
+            <p:extLst>
+              <p:ext uri="{386F3935-93C4-4BCD-93E2-E3B085C9AB24}">
+                <p16:designElem xmlns:p16="http://schemas.microsoft.com/office/powerpoint/2015/main" val="1"/>
+              </p:ext>
+            </p:extLst>
+          </p:nvPr>
+        </p:nvSpPr>
+        <p:spPr>
+          <a:xfrm>
+            <a:off x="0" y="0"/>
+            <a:ext cx="12192000" cy="6858000"/>
+          </a:xfrm>
+          <a:prstGeom prst="rect">
+            <a:avLst/>
+          </a:prstGeom>
+          <a:solidFill>
+            <a:schemeClr val="bg2"/>
+          </a:solidFill>
+          <a:ln>
+            <a:noFill/>
+          </a:ln>
+        </p:spPr>
+        <p:style>
+          <a:lnRef idx="2">
+            <a:schemeClr val="accent1">
+              <a:shade val="50000"/>
+            </a:schemeClr>
+          </a:lnRef>
+          <a:fillRef idx="1">
+            <a:schemeClr val="accent1"/>
+          </a:fillRef>
+          <a:effectRef idx="0">
+            <a:schemeClr val="accent1"/>
+          </a:effectRef>
+          <a:fontRef idx="minor">
+            <a:schemeClr val="lt1"/>
+          </a:fontRef>
+        </p:style>
+        <p:txBody>
+          <a:bodyPr rtlCol="0" anchor="ctr"/>
+          <a:lstStyle/>
+          <a:p>
+            <a:pPr algn="ctr"/>
+            <a:endParaRPr lang="en-US"/>
+          </a:p>
+        </p:txBody>
+      </p:sp>
+      <p:sp>
+        <p:nvSpPr>
+          <p:cNvPr id="24" name="Rectangle 23">
+            <a:extLst>
+              <a:ext uri="{FF2B5EF4-FFF2-40B4-BE49-F238E27FC236}">
+                <a16:creationId xmlns:a16="http://schemas.microsoft.com/office/drawing/2014/main" id="{9E67A204-FB90-4B26-B155-3FA8064AD2DF}"/>
+              </a:ext>
+              <a:ext uri="{C183D7F6-B498-43B3-948B-1728B52AA6E4}">
+                <adec:decorative xmlns:adec="http://schemas.microsoft.com/office/drawing/2017/decorative" val="1"/>
+              </a:ext>
+            </a:extLst>
+          </p:cNvPr>
+          <p:cNvSpPr>
+            <a:spLocks noGrp="1" noRot="1" noChangeAspect="1" noMove="1" noResize="1" noEditPoints="1" noAdjustHandles="1" noChangeArrowheads="1" noChangeShapeType="1" noTextEdit="1"/>
+          </p:cNvSpPr>
+          <p:nvPr>
+            <p:extLst>
+              <p:ext uri="{386F3935-93C4-4BCD-93E2-E3B085C9AB24}">
+                <p16:designElem xmlns:p16="http://schemas.microsoft.com/office/powerpoint/2015/main" val="1"/>
+              </p:ext>
+            </p:extLst>
+          </p:nvPr>
+        </p:nvSpPr>
+        <p:spPr>
+          <a:xfrm>
+            <a:off x="477012" y="480060"/>
+            <a:ext cx="11237976" cy="5897880"/>
+          </a:xfrm>
+          <a:prstGeom prst="rect">
+            <a:avLst/>
+          </a:prstGeom>
+          <a:solidFill>
+            <a:schemeClr val="bg1"/>
+          </a:solidFill>
+          <a:ln w="22225">
+            <a:solidFill>
+              <a:srgbClr val="C17F63"/>
+            </a:solidFill>
+          </a:ln>
+        </p:spPr>
+        <p:style>
+          <a:lnRef idx="2">
+            <a:schemeClr val="accent1">
+              <a:shade val="50000"/>
+            </a:schemeClr>
+          </a:lnRef>
+          <a:fillRef idx="1">
+            <a:schemeClr val="accent1"/>
+          </a:fillRef>
+          <a:effectRef idx="0">
+            <a:schemeClr val="accent1"/>
+          </a:effectRef>
+          <a:fontRef idx="minor">
+            <a:schemeClr val="lt1"/>
+          </a:fontRef>
+        </p:style>
+        <p:txBody>
+          <a:bodyPr rtlCol="0" anchor="ctr"/>
+          <a:lstStyle/>
+          <a:p>
+            <a:pPr algn="ctr"/>
+            <a:endParaRPr lang="en-US"/>
+          </a:p>
+        </p:txBody>
+      </p:sp>
+      <p:pic>
+        <p:nvPicPr>
+          <p:cNvPr id="3" name="Grafik 2" descr="Ein Bild, das schwimmend, grün, sitzend, haltend enthält.&#10;&#10;Automatisch generierte Beschreibung">
+            <a:extLst>
+              <a:ext uri="{FF2B5EF4-FFF2-40B4-BE49-F238E27FC236}">
+                <a16:creationId xmlns:a16="http://schemas.microsoft.com/office/drawing/2014/main" id="{79A94BF5-5C1D-4210-B325-A8962E06FB12}"/>
+              </a:ext>
+            </a:extLst>
+          </p:cNvPr>
+          <p:cNvPicPr>
+            <a:picLocks noChangeAspect="1"/>
+          </p:cNvPicPr>
+          <p:nvPr/>
+        </p:nvPicPr>
+        <p:blipFill>
+          <a:blip r:embed="rId2">
+            <a:extLst>
+              <a:ext uri="{28A0092B-C50C-407E-A947-70E740481C1C}">
+                <a14:useLocalDpi xmlns:a14="http://schemas.microsoft.com/office/drawing/2010/main" val="0"/>
+              </a:ext>
+            </a:extLst>
+          </a:blip>
+          <a:stretch>
+            <a:fillRect/>
+          </a:stretch>
+        </p:blipFill>
+        <p:spPr>
+          <a:xfrm>
+            <a:off x="1153668" y="1263115"/>
+            <a:ext cx="9884664" cy="5073075"/>
+          </a:xfrm>
+          <a:prstGeom prst="rect">
+            <a:avLst/>
+          </a:prstGeom>
+        </p:spPr>
+      </p:pic>
+      <p:sp>
+        <p:nvSpPr>
+          <p:cNvPr id="4" name="Textfeld 3">
+            <a:extLst>
+              <a:ext uri="{FF2B5EF4-FFF2-40B4-BE49-F238E27FC236}">
+                <a16:creationId xmlns:a16="http://schemas.microsoft.com/office/drawing/2014/main" id="{E5DEB3FE-FEC3-4ACC-B79E-F749C8194B3C}"/>
+              </a:ext>
+            </a:extLst>
+          </p:cNvPr>
+          <p:cNvSpPr txBox="1"/>
+          <p:nvPr/>
+        </p:nvSpPr>
+        <p:spPr>
+          <a:xfrm>
+            <a:off x="3439856" y="548422"/>
+            <a:ext cx="5312288" cy="646331"/>
+          </a:xfrm>
+          <a:prstGeom prst="rect">
+            <a:avLst/>
+          </a:prstGeom>
+          <a:noFill/>
+        </p:spPr>
+        <p:txBody>
+          <a:bodyPr wrap="none" rtlCol="0">
+            <a:spAutoFit/>
+          </a:bodyPr>
+          <a:lstStyle/>
+          <a:p>
+            <a:r>
+              <a:rPr lang="de-DE" sz="3600" dirty="0"/>
+              <a:t>Automatisierte Algenfarmen</a:t>
+            </a:r>
+          </a:p>
+        </p:txBody>
+      </p:sp>
+    </p:spTree>
+    <p:extLst>
+      <p:ext uri="{BB962C8B-B14F-4D97-AF65-F5344CB8AC3E}">
+        <p14:creationId xmlns:p14="http://schemas.microsoft.com/office/powerpoint/2010/main" val="112858198"/>
       </p:ext>
     </p:extLst>
   </p:cSld>

</xml_diff>

<commit_message>
präsi noch weiter aufgehübscht
</commit_message>
<xml_diff>
--- a/Meilenstein 1/Präsentation/Präsentation MS1.pptx
+++ b/Meilenstein 1/Präsentation/Präsentation MS1.pptx
@@ -5,7 +5,7 @@
     <p:sldMasterId id="2147483756" r:id="rId1"/>
   </p:sldMasterIdLst>
   <p:notesMasterIdLst>
-    <p:notesMasterId r:id="rId23"/>
+    <p:notesMasterId r:id="rId24"/>
   </p:notesMasterIdLst>
   <p:sldIdLst>
     <p:sldId id="256" r:id="rId2"/>
@@ -18,17 +18,18 @@
     <p:sldId id="261" r:id="rId9"/>
     <p:sldId id="273" r:id="rId10"/>
     <p:sldId id="268" r:id="rId11"/>
-    <p:sldId id="270" r:id="rId12"/>
-    <p:sldId id="275" r:id="rId13"/>
-    <p:sldId id="276" r:id="rId14"/>
-    <p:sldId id="274" r:id="rId15"/>
-    <p:sldId id="279" r:id="rId16"/>
-    <p:sldId id="282" r:id="rId17"/>
-    <p:sldId id="278" r:id="rId18"/>
-    <p:sldId id="280" r:id="rId19"/>
-    <p:sldId id="277" r:id="rId20"/>
-    <p:sldId id="281" r:id="rId21"/>
-    <p:sldId id="272" r:id="rId22"/>
+    <p:sldId id="283" r:id="rId12"/>
+    <p:sldId id="270" r:id="rId13"/>
+    <p:sldId id="275" r:id="rId14"/>
+    <p:sldId id="276" r:id="rId15"/>
+    <p:sldId id="274" r:id="rId16"/>
+    <p:sldId id="279" r:id="rId17"/>
+    <p:sldId id="282" r:id="rId18"/>
+    <p:sldId id="278" r:id="rId19"/>
+    <p:sldId id="280" r:id="rId20"/>
+    <p:sldId id="277" r:id="rId21"/>
+    <p:sldId id="281" r:id="rId22"/>
+    <p:sldId id="272" r:id="rId23"/>
   </p:sldIdLst>
   <p:sldSz cx="12192000" cy="6858000"/>
   <p:notesSz cx="6858000" cy="9144000"/>
@@ -4966,6 +4967,797 @@
           <p:cNvPr id="2" name="Textfeld 1">
             <a:extLst>
               <a:ext uri="{FF2B5EF4-FFF2-40B4-BE49-F238E27FC236}">
+                <a16:creationId xmlns:a16="http://schemas.microsoft.com/office/drawing/2014/main" id="{91CF4895-9E43-4451-AD30-62BB9C62C0DB}"/>
+              </a:ext>
+            </a:extLst>
+          </p:cNvPr>
+          <p:cNvSpPr txBox="1"/>
+          <p:nvPr/>
+        </p:nvSpPr>
+        <p:spPr>
+          <a:xfrm>
+            <a:off x="685800" y="795528"/>
+            <a:ext cx="184731" cy="369332"/>
+          </a:xfrm>
+          <a:prstGeom prst="rect">
+            <a:avLst/>
+          </a:prstGeom>
+          <a:noFill/>
+        </p:spPr>
+        <p:txBody>
+          <a:bodyPr wrap="none" rtlCol="0">
+            <a:spAutoFit/>
+          </a:bodyPr>
+          <a:lstStyle/>
+          <a:p>
+            <a:endParaRPr lang="de-DE" dirty="0"/>
+          </a:p>
+        </p:txBody>
+      </p:sp>
+      <p:pic>
+        <p:nvPicPr>
+          <p:cNvPr id="4" name="Grafik 3" descr="Bauernhofszenerie">
+            <a:extLst>
+              <a:ext uri="{FF2B5EF4-FFF2-40B4-BE49-F238E27FC236}">
+                <a16:creationId xmlns:a16="http://schemas.microsoft.com/office/drawing/2014/main" id="{6C5F4E65-3FBD-4426-8449-563118469D17}"/>
+              </a:ext>
+            </a:extLst>
+          </p:cNvPr>
+          <p:cNvPicPr>
+            <a:picLocks noChangeAspect="1"/>
+          </p:cNvPicPr>
+          <p:nvPr/>
+        </p:nvPicPr>
+        <p:blipFill>
+          <a:blip r:embed="rId2">
+            <a:extLst>
+              <a:ext uri="{28A0092B-C50C-407E-A947-70E740481C1C}">
+                <a14:useLocalDpi xmlns:a14="http://schemas.microsoft.com/office/drawing/2010/main" val="0"/>
+              </a:ext>
+              <a:ext uri="{96DAC541-7B7A-43D3-8B79-37D633B846F1}">
+                <asvg:svgBlip xmlns:asvg="http://schemas.microsoft.com/office/drawing/2016/SVG/main" r:embed="rId3"/>
+              </a:ext>
+            </a:extLst>
+          </a:blip>
+          <a:stretch>
+            <a:fillRect/>
+          </a:stretch>
+        </p:blipFill>
+        <p:spPr>
+          <a:xfrm>
+            <a:off x="6956611" y="1484600"/>
+            <a:ext cx="1206477" cy="1206477"/>
+          </a:xfrm>
+          <a:prstGeom prst="rect">
+            <a:avLst/>
+          </a:prstGeom>
+        </p:spPr>
+      </p:pic>
+      <p:pic>
+        <p:nvPicPr>
+          <p:cNvPr id="8" name="Grafik 7" descr="Seetang">
+            <a:extLst>
+              <a:ext uri="{FF2B5EF4-FFF2-40B4-BE49-F238E27FC236}">
+                <a16:creationId xmlns:a16="http://schemas.microsoft.com/office/drawing/2014/main" id="{44ECA660-3DA1-4974-8250-DA9CD4A1B99E}"/>
+              </a:ext>
+            </a:extLst>
+          </p:cNvPr>
+          <p:cNvPicPr>
+            <a:picLocks noChangeAspect="1"/>
+          </p:cNvPicPr>
+          <p:nvPr/>
+        </p:nvPicPr>
+        <p:blipFill>
+          <a:blip r:embed="rId4">
+            <a:extLst>
+              <a:ext uri="{28A0092B-C50C-407E-A947-70E740481C1C}">
+                <a14:useLocalDpi xmlns:a14="http://schemas.microsoft.com/office/drawing/2010/main" val="0"/>
+              </a:ext>
+              <a:ext uri="{96DAC541-7B7A-43D3-8B79-37D633B846F1}">
+                <asvg:svgBlip xmlns:asvg="http://schemas.microsoft.com/office/drawing/2016/SVG/main" r:embed="rId5"/>
+              </a:ext>
+            </a:extLst>
+          </a:blip>
+          <a:stretch>
+            <a:fillRect/>
+          </a:stretch>
+        </p:blipFill>
+        <p:spPr>
+          <a:xfrm>
+            <a:off x="5465953" y="3643195"/>
+            <a:ext cx="1206477" cy="1206477"/>
+          </a:xfrm>
+          <a:prstGeom prst="rect">
+            <a:avLst/>
+          </a:prstGeom>
+        </p:spPr>
+      </p:pic>
+      <p:pic>
+        <p:nvPicPr>
+          <p:cNvPr id="10" name="Grafik 9" descr="Zurück">
+            <a:extLst>
+              <a:ext uri="{FF2B5EF4-FFF2-40B4-BE49-F238E27FC236}">
+                <a16:creationId xmlns:a16="http://schemas.microsoft.com/office/drawing/2014/main" id="{F8B1C1C4-3DEE-4382-A91F-21759342F36E}"/>
+              </a:ext>
+            </a:extLst>
+          </p:cNvPr>
+          <p:cNvPicPr>
+            <a:picLocks noChangeAspect="1"/>
+          </p:cNvPicPr>
+          <p:nvPr/>
+        </p:nvPicPr>
+        <p:blipFill>
+          <a:blip r:embed="rId6">
+            <a:extLst>
+              <a:ext uri="{28A0092B-C50C-407E-A947-70E740481C1C}">
+                <a14:useLocalDpi xmlns:a14="http://schemas.microsoft.com/office/drawing/2010/main" val="0"/>
+              </a:ext>
+              <a:ext uri="{96DAC541-7B7A-43D3-8B79-37D633B846F1}">
+                <asvg:svgBlip xmlns:asvg="http://schemas.microsoft.com/office/drawing/2016/SVG/main" r:embed="rId7"/>
+              </a:ext>
+            </a:extLst>
+          </a:blip>
+          <a:stretch>
+            <a:fillRect/>
+          </a:stretch>
+        </p:blipFill>
+        <p:spPr>
+          <a:xfrm rot="4765067">
+            <a:off x="8300337" y="2453673"/>
+            <a:ext cx="1206477" cy="1206477"/>
+          </a:xfrm>
+          <a:prstGeom prst="rect">
+            <a:avLst/>
+          </a:prstGeom>
+        </p:spPr>
+      </p:pic>
+      <p:pic>
+        <p:nvPicPr>
+          <p:cNvPr id="11" name="Grafik 10" descr="Zurück">
+            <a:extLst>
+              <a:ext uri="{FF2B5EF4-FFF2-40B4-BE49-F238E27FC236}">
+                <a16:creationId xmlns:a16="http://schemas.microsoft.com/office/drawing/2014/main" id="{C5D3DDEB-3253-4BB8-8E71-705FAF6FC2E0}"/>
+              </a:ext>
+            </a:extLst>
+          </p:cNvPr>
+          <p:cNvPicPr>
+            <a:picLocks noChangeAspect="1"/>
+          </p:cNvPicPr>
+          <p:nvPr/>
+        </p:nvPicPr>
+        <p:blipFill>
+          <a:blip r:embed="rId6">
+            <a:extLst>
+              <a:ext uri="{28A0092B-C50C-407E-A947-70E740481C1C}">
+                <a14:useLocalDpi xmlns:a14="http://schemas.microsoft.com/office/drawing/2010/main" val="0"/>
+              </a:ext>
+              <a:ext uri="{96DAC541-7B7A-43D3-8B79-37D633B846F1}">
+                <asvg:svgBlip xmlns:asvg="http://schemas.microsoft.com/office/drawing/2016/SVG/main" r:embed="rId7"/>
+              </a:ext>
+            </a:extLst>
+          </a:blip>
+          <a:stretch>
+            <a:fillRect/>
+          </a:stretch>
+        </p:blipFill>
+        <p:spPr>
+          <a:xfrm rot="12309436">
+            <a:off x="6766673" y="4291231"/>
+            <a:ext cx="1206477" cy="1206477"/>
+          </a:xfrm>
+          <a:prstGeom prst="rect">
+            <a:avLst/>
+          </a:prstGeom>
+        </p:spPr>
+      </p:pic>
+      <p:pic>
+        <p:nvPicPr>
+          <p:cNvPr id="12" name="Grafik 11" descr="Zurück">
+            <a:extLst>
+              <a:ext uri="{FF2B5EF4-FFF2-40B4-BE49-F238E27FC236}">
+                <a16:creationId xmlns:a16="http://schemas.microsoft.com/office/drawing/2014/main" id="{80E7608F-D860-4B72-83F4-2A7F4031752A}"/>
+              </a:ext>
+            </a:extLst>
+          </p:cNvPr>
+          <p:cNvPicPr>
+            <a:picLocks noChangeAspect="1"/>
+          </p:cNvPicPr>
+          <p:nvPr/>
+        </p:nvPicPr>
+        <p:blipFill>
+          <a:blip r:embed="rId6">
+            <a:extLst>
+              <a:ext uri="{28A0092B-C50C-407E-A947-70E740481C1C}">
+                <a14:useLocalDpi xmlns:a14="http://schemas.microsoft.com/office/drawing/2010/main" val="0"/>
+              </a:ext>
+              <a:ext uri="{96DAC541-7B7A-43D3-8B79-37D633B846F1}">
+                <asvg:svgBlip xmlns:asvg="http://schemas.microsoft.com/office/drawing/2016/SVG/main" r:embed="rId7"/>
+              </a:ext>
+            </a:extLst>
+          </a:blip>
+          <a:stretch>
+            <a:fillRect/>
+          </a:stretch>
+        </p:blipFill>
+        <p:spPr>
+          <a:xfrm rot="20455584">
+            <a:off x="5751999" y="2245699"/>
+            <a:ext cx="1206477" cy="1206477"/>
+          </a:xfrm>
+          <a:prstGeom prst="rect">
+            <a:avLst/>
+          </a:prstGeom>
+        </p:spPr>
+      </p:pic>
+      <p:pic>
+        <p:nvPicPr>
+          <p:cNvPr id="16" name="Grafik 15" descr="Welle">
+            <a:extLst>
+              <a:ext uri="{FF2B5EF4-FFF2-40B4-BE49-F238E27FC236}">
+                <a16:creationId xmlns:a16="http://schemas.microsoft.com/office/drawing/2014/main" id="{D599114F-3911-4EB2-A4FF-F98D45AF2763}"/>
+              </a:ext>
+            </a:extLst>
+          </p:cNvPr>
+          <p:cNvPicPr>
+            <a:picLocks noChangeAspect="1"/>
+          </p:cNvPicPr>
+          <p:nvPr/>
+        </p:nvPicPr>
+        <p:blipFill>
+          <a:blip r:embed="rId8">
+            <a:extLst>
+              <a:ext uri="{28A0092B-C50C-407E-A947-70E740481C1C}">
+                <a14:useLocalDpi xmlns:a14="http://schemas.microsoft.com/office/drawing/2010/main" val="0"/>
+              </a:ext>
+              <a:ext uri="{96DAC541-7B7A-43D3-8B79-37D633B846F1}">
+                <asvg:svgBlip xmlns:asvg="http://schemas.microsoft.com/office/drawing/2016/SVG/main" r:embed="rId9"/>
+              </a:ext>
+            </a:extLst>
+          </a:blip>
+          <a:stretch>
+            <a:fillRect/>
+          </a:stretch>
+        </p:blipFill>
+        <p:spPr>
+          <a:xfrm>
+            <a:off x="8411411" y="3661765"/>
+            <a:ext cx="1206477" cy="1206477"/>
+          </a:xfrm>
+          <a:prstGeom prst="rect">
+            <a:avLst/>
+          </a:prstGeom>
+        </p:spPr>
+      </p:pic>
+      <p:sp>
+        <p:nvSpPr>
+          <p:cNvPr id="17" name="Textfeld 16">
+            <a:extLst>
+              <a:ext uri="{FF2B5EF4-FFF2-40B4-BE49-F238E27FC236}">
+                <a16:creationId xmlns:a16="http://schemas.microsoft.com/office/drawing/2014/main" id="{2296DC10-F4A0-4542-BF55-5A218C87882A}"/>
+              </a:ext>
+            </a:extLst>
+          </p:cNvPr>
+          <p:cNvSpPr txBox="1"/>
+          <p:nvPr/>
+        </p:nvSpPr>
+        <p:spPr>
+          <a:xfrm>
+            <a:off x="1113556" y="1161434"/>
+            <a:ext cx="4121834" cy="646331"/>
+          </a:xfrm>
+          <a:prstGeom prst="rect">
+            <a:avLst/>
+          </a:prstGeom>
+          <a:noFill/>
+        </p:spPr>
+        <p:txBody>
+          <a:bodyPr wrap="none" rtlCol="0">
+            <a:spAutoFit/>
+          </a:bodyPr>
+          <a:lstStyle/>
+          <a:p>
+            <a:r>
+              <a:rPr lang="de-DE" sz="3600" dirty="0"/>
+              <a:t>Positiver Nebeneffekt</a:t>
+            </a:r>
+          </a:p>
+        </p:txBody>
+      </p:sp>
+    </p:spTree>
+    <p:extLst>
+      <p:ext uri="{BB962C8B-B14F-4D97-AF65-F5344CB8AC3E}">
+        <p14:creationId xmlns:p14="http://schemas.microsoft.com/office/powerpoint/2010/main" val="1536746075"/>
+      </p:ext>
+    </p:extLst>
+  </p:cSld>
+  <p:clrMapOvr>
+    <a:masterClrMapping/>
+  </p:clrMapOvr>
+  <p:timing>
+    <p:tnLst>
+      <p:par>
+        <p:cTn id="1" dur="indefinite" restart="never" nodeType="tmRoot">
+          <p:childTnLst>
+            <p:seq concurrent="1" nextAc="seek">
+              <p:cTn id="2" dur="indefinite" nodeType="mainSeq">
+                <p:childTnLst>
+                  <p:par>
+                    <p:cTn id="3" fill="hold">
+                      <p:stCondLst>
+                        <p:cond delay="indefinite"/>
+                      </p:stCondLst>
+                      <p:childTnLst>
+                        <p:par>
+                          <p:cTn id="4" fill="hold">
+                            <p:stCondLst>
+                              <p:cond delay="0"/>
+                            </p:stCondLst>
+                            <p:childTnLst>
+                              <p:par>
+                                <p:cTn id="5" presetID="1" presetClass="entr" presetSubtype="0" fill="hold" nodeType="clickEffect">
+                                  <p:stCondLst>
+                                    <p:cond delay="0"/>
+                                  </p:stCondLst>
+                                  <p:childTnLst>
+                                    <p:set>
+                                      <p:cBhvr>
+                                        <p:cTn id="6" dur="1" fill="hold">
+                                          <p:stCondLst>
+                                            <p:cond delay="0"/>
+                                          </p:stCondLst>
+                                        </p:cTn>
+                                        <p:tgtEl>
+                                          <p:spTgt spid="4"/>
+                                        </p:tgtEl>
+                                        <p:attrNameLst>
+                                          <p:attrName>style.visibility</p:attrName>
+                                        </p:attrNameLst>
+                                      </p:cBhvr>
+                                      <p:to>
+                                        <p:strVal val="visible"/>
+                                      </p:to>
+                                    </p:set>
+                                  </p:childTnLst>
+                                </p:cTn>
+                              </p:par>
+                            </p:childTnLst>
+                          </p:cTn>
+                        </p:par>
+                      </p:childTnLst>
+                    </p:cTn>
+                  </p:par>
+                  <p:par>
+                    <p:cTn id="7" fill="hold">
+                      <p:stCondLst>
+                        <p:cond delay="indefinite"/>
+                      </p:stCondLst>
+                      <p:childTnLst>
+                        <p:par>
+                          <p:cTn id="8" fill="hold">
+                            <p:stCondLst>
+                              <p:cond delay="0"/>
+                            </p:stCondLst>
+                            <p:childTnLst>
+                              <p:par>
+                                <p:cTn id="9" presetID="22" presetClass="entr" presetSubtype="1" fill="hold" nodeType="clickEffect">
+                                  <p:stCondLst>
+                                    <p:cond delay="0"/>
+                                  </p:stCondLst>
+                                  <p:childTnLst>
+                                    <p:set>
+                                      <p:cBhvr>
+                                        <p:cTn id="10" dur="1" fill="hold">
+                                          <p:stCondLst>
+                                            <p:cond delay="0"/>
+                                          </p:stCondLst>
+                                        </p:cTn>
+                                        <p:tgtEl>
+                                          <p:spTgt spid="10"/>
+                                        </p:tgtEl>
+                                        <p:attrNameLst>
+                                          <p:attrName>style.visibility</p:attrName>
+                                        </p:attrNameLst>
+                                      </p:cBhvr>
+                                      <p:to>
+                                        <p:strVal val="visible"/>
+                                      </p:to>
+                                    </p:set>
+                                    <p:animEffect transition="in" filter="wipe(up)">
+                                      <p:cBhvr>
+                                        <p:cTn id="11" dur="500"/>
+                                        <p:tgtEl>
+                                          <p:spTgt spid="10"/>
+                                        </p:tgtEl>
+                                      </p:cBhvr>
+                                    </p:animEffect>
+                                  </p:childTnLst>
+                                </p:cTn>
+                              </p:par>
+                            </p:childTnLst>
+                          </p:cTn>
+                        </p:par>
+                      </p:childTnLst>
+                    </p:cTn>
+                  </p:par>
+                  <p:par>
+                    <p:cTn id="12" fill="hold">
+                      <p:stCondLst>
+                        <p:cond delay="indefinite"/>
+                      </p:stCondLst>
+                      <p:childTnLst>
+                        <p:par>
+                          <p:cTn id="13" fill="hold">
+                            <p:stCondLst>
+                              <p:cond delay="0"/>
+                            </p:stCondLst>
+                            <p:childTnLst>
+                              <p:par>
+                                <p:cTn id="14" presetID="1" presetClass="entr" presetSubtype="0" fill="hold" nodeType="clickEffect">
+                                  <p:stCondLst>
+                                    <p:cond delay="0"/>
+                                  </p:stCondLst>
+                                  <p:childTnLst>
+                                    <p:set>
+                                      <p:cBhvr>
+                                        <p:cTn id="15" dur="1" fill="hold">
+                                          <p:stCondLst>
+                                            <p:cond delay="0"/>
+                                          </p:stCondLst>
+                                        </p:cTn>
+                                        <p:tgtEl>
+                                          <p:spTgt spid="16"/>
+                                        </p:tgtEl>
+                                        <p:attrNameLst>
+                                          <p:attrName>style.visibility</p:attrName>
+                                        </p:attrNameLst>
+                                      </p:cBhvr>
+                                      <p:to>
+                                        <p:strVal val="visible"/>
+                                      </p:to>
+                                    </p:set>
+                                  </p:childTnLst>
+                                </p:cTn>
+                              </p:par>
+                            </p:childTnLst>
+                          </p:cTn>
+                        </p:par>
+                      </p:childTnLst>
+                    </p:cTn>
+                  </p:par>
+                  <p:par>
+                    <p:cTn id="16" fill="hold">
+                      <p:stCondLst>
+                        <p:cond delay="indefinite"/>
+                      </p:stCondLst>
+                      <p:childTnLst>
+                        <p:par>
+                          <p:cTn id="17" fill="hold">
+                            <p:stCondLst>
+                              <p:cond delay="0"/>
+                            </p:stCondLst>
+                            <p:childTnLst>
+                              <p:par>
+                                <p:cTn id="18" presetID="22" presetClass="entr" presetSubtype="2" fill="hold" nodeType="clickEffect">
+                                  <p:stCondLst>
+                                    <p:cond delay="0"/>
+                                  </p:stCondLst>
+                                  <p:childTnLst>
+                                    <p:set>
+                                      <p:cBhvr>
+                                        <p:cTn id="19" dur="1" fill="hold">
+                                          <p:stCondLst>
+                                            <p:cond delay="0"/>
+                                          </p:stCondLst>
+                                        </p:cTn>
+                                        <p:tgtEl>
+                                          <p:spTgt spid="11"/>
+                                        </p:tgtEl>
+                                        <p:attrNameLst>
+                                          <p:attrName>style.visibility</p:attrName>
+                                        </p:attrNameLst>
+                                      </p:cBhvr>
+                                      <p:to>
+                                        <p:strVal val="visible"/>
+                                      </p:to>
+                                    </p:set>
+                                    <p:animEffect transition="in" filter="wipe(right)">
+                                      <p:cBhvr>
+                                        <p:cTn id="20" dur="500"/>
+                                        <p:tgtEl>
+                                          <p:spTgt spid="11"/>
+                                        </p:tgtEl>
+                                      </p:cBhvr>
+                                    </p:animEffect>
+                                  </p:childTnLst>
+                                </p:cTn>
+                              </p:par>
+                            </p:childTnLst>
+                          </p:cTn>
+                        </p:par>
+                      </p:childTnLst>
+                    </p:cTn>
+                  </p:par>
+                  <p:par>
+                    <p:cTn id="21" fill="hold">
+                      <p:stCondLst>
+                        <p:cond delay="indefinite"/>
+                      </p:stCondLst>
+                      <p:childTnLst>
+                        <p:par>
+                          <p:cTn id="22" fill="hold">
+                            <p:stCondLst>
+                              <p:cond delay="0"/>
+                            </p:stCondLst>
+                            <p:childTnLst>
+                              <p:par>
+                                <p:cTn id="23" presetID="1" presetClass="entr" presetSubtype="0" fill="hold" nodeType="clickEffect">
+                                  <p:stCondLst>
+                                    <p:cond delay="0"/>
+                                  </p:stCondLst>
+                                  <p:childTnLst>
+                                    <p:set>
+                                      <p:cBhvr>
+                                        <p:cTn id="24" dur="1" fill="hold">
+                                          <p:stCondLst>
+                                            <p:cond delay="0"/>
+                                          </p:stCondLst>
+                                        </p:cTn>
+                                        <p:tgtEl>
+                                          <p:spTgt spid="8"/>
+                                        </p:tgtEl>
+                                        <p:attrNameLst>
+                                          <p:attrName>style.visibility</p:attrName>
+                                        </p:attrNameLst>
+                                      </p:cBhvr>
+                                      <p:to>
+                                        <p:strVal val="visible"/>
+                                      </p:to>
+                                    </p:set>
+                                  </p:childTnLst>
+                                </p:cTn>
+                              </p:par>
+                            </p:childTnLst>
+                          </p:cTn>
+                        </p:par>
+                      </p:childTnLst>
+                    </p:cTn>
+                  </p:par>
+                  <p:par>
+                    <p:cTn id="25" fill="hold">
+                      <p:stCondLst>
+                        <p:cond delay="indefinite"/>
+                      </p:stCondLst>
+                      <p:childTnLst>
+                        <p:par>
+                          <p:cTn id="26" fill="hold">
+                            <p:stCondLst>
+                              <p:cond delay="0"/>
+                            </p:stCondLst>
+                            <p:childTnLst>
+                              <p:par>
+                                <p:cTn id="27" presetID="22" presetClass="entr" presetSubtype="4" fill="hold" nodeType="clickEffect">
+                                  <p:stCondLst>
+                                    <p:cond delay="0"/>
+                                  </p:stCondLst>
+                                  <p:childTnLst>
+                                    <p:set>
+                                      <p:cBhvr>
+                                        <p:cTn id="28" dur="1" fill="hold">
+                                          <p:stCondLst>
+                                            <p:cond delay="0"/>
+                                          </p:stCondLst>
+                                        </p:cTn>
+                                        <p:tgtEl>
+                                          <p:spTgt spid="12"/>
+                                        </p:tgtEl>
+                                        <p:attrNameLst>
+                                          <p:attrName>style.visibility</p:attrName>
+                                        </p:attrNameLst>
+                                      </p:cBhvr>
+                                      <p:to>
+                                        <p:strVal val="visible"/>
+                                      </p:to>
+                                    </p:set>
+                                    <p:animEffect transition="in" filter="wipe(down)">
+                                      <p:cBhvr>
+                                        <p:cTn id="29" dur="500"/>
+                                        <p:tgtEl>
+                                          <p:spTgt spid="12"/>
+                                        </p:tgtEl>
+                                      </p:cBhvr>
+                                    </p:animEffect>
+                                  </p:childTnLst>
+                                </p:cTn>
+                              </p:par>
+                            </p:childTnLst>
+                          </p:cTn>
+                        </p:par>
+                      </p:childTnLst>
+                    </p:cTn>
+                  </p:par>
+                </p:childTnLst>
+              </p:cTn>
+              <p:prevCondLst>
+                <p:cond evt="onPrev" delay="0">
+                  <p:tgtEl>
+                    <p:sldTgt/>
+                  </p:tgtEl>
+                </p:cond>
+              </p:prevCondLst>
+              <p:nextCondLst>
+                <p:cond evt="onNext" delay="0">
+                  <p:tgtEl>
+                    <p:sldTgt/>
+                  </p:tgtEl>
+                </p:cond>
+              </p:nextCondLst>
+            </p:seq>
+          </p:childTnLst>
+        </p:cTn>
+      </p:par>
+    </p:tnLst>
+  </p:timing>
+</p:sld>
+</file>
+
+<file path=ppt/slides/slide12.xml><?xml version="1.0" encoding="utf-8"?>
+<p:sld xmlns:a="http://schemas.openxmlformats.org/drawingml/2006/main" xmlns:r="http://schemas.openxmlformats.org/officeDocument/2006/relationships" xmlns:p="http://schemas.openxmlformats.org/presentationml/2006/main">
+  <p:cSld>
+    <p:bg>
+      <p:bgPr>
+        <a:solidFill>
+          <a:srgbClr val="4960A6"/>
+        </a:solidFill>
+        <a:effectLst/>
+      </p:bgPr>
+    </p:bg>
+    <p:spTree>
+      <p:nvGrpSpPr>
+        <p:cNvPr id="1" name=""/>
+        <p:cNvGrpSpPr/>
+        <p:nvPr/>
+      </p:nvGrpSpPr>
+      <p:grpSpPr>
+        <a:xfrm>
+          <a:off x="0" y="0"/>
+          <a:ext cx="0" cy="0"/>
+          <a:chOff x="0" y="0"/>
+          <a:chExt cx="0" cy="0"/>
+        </a:xfrm>
+      </p:grpSpPr>
+      <p:sp>
+        <p:nvSpPr>
+          <p:cNvPr id="22" name="Rectangle 21">
+            <a:extLst>
+              <a:ext uri="{FF2B5EF4-FFF2-40B4-BE49-F238E27FC236}">
+                <a16:creationId xmlns:a16="http://schemas.microsoft.com/office/drawing/2014/main" id="{44B3F5F5-166C-4694-B20A-3F8218AF7D03}"/>
+              </a:ext>
+              <a:ext uri="{C183D7F6-B498-43B3-948B-1728B52AA6E4}">
+                <adec:decorative xmlns:adec="http://schemas.microsoft.com/office/drawing/2017/decorative" val="1"/>
+              </a:ext>
+            </a:extLst>
+          </p:cNvPr>
+          <p:cNvSpPr>
+            <a:spLocks noGrp="1" noRot="1" noChangeAspect="1" noMove="1" noResize="1" noEditPoints="1" noAdjustHandles="1" noChangeArrowheads="1" noChangeShapeType="1" noTextEdit="1"/>
+          </p:cNvSpPr>
+          <p:nvPr>
+            <p:extLst>
+              <p:ext uri="{386F3935-93C4-4BCD-93E2-E3B085C9AB24}">
+                <p16:designElem xmlns:p16="http://schemas.microsoft.com/office/powerpoint/2015/main" val="1"/>
+              </p:ext>
+            </p:extLst>
+          </p:nvPr>
+        </p:nvSpPr>
+        <p:spPr>
+          <a:xfrm>
+            <a:off x="0" y="0"/>
+            <a:ext cx="12192000" cy="6858000"/>
+          </a:xfrm>
+          <a:prstGeom prst="rect">
+            <a:avLst/>
+          </a:prstGeom>
+          <a:solidFill>
+            <a:schemeClr val="bg2"/>
+          </a:solidFill>
+          <a:ln>
+            <a:noFill/>
+          </a:ln>
+        </p:spPr>
+        <p:style>
+          <a:lnRef idx="2">
+            <a:schemeClr val="accent1">
+              <a:shade val="50000"/>
+            </a:schemeClr>
+          </a:lnRef>
+          <a:fillRef idx="1">
+            <a:schemeClr val="accent1"/>
+          </a:fillRef>
+          <a:effectRef idx="0">
+            <a:schemeClr val="accent1"/>
+          </a:effectRef>
+          <a:fontRef idx="minor">
+            <a:schemeClr val="lt1"/>
+          </a:fontRef>
+        </p:style>
+        <p:txBody>
+          <a:bodyPr rtlCol="0" anchor="ctr"/>
+          <a:lstStyle/>
+          <a:p>
+            <a:pPr algn="ctr"/>
+            <a:endParaRPr lang="en-US"/>
+          </a:p>
+        </p:txBody>
+      </p:sp>
+      <p:sp>
+        <p:nvSpPr>
+          <p:cNvPr id="24" name="Rectangle 23">
+            <a:extLst>
+              <a:ext uri="{FF2B5EF4-FFF2-40B4-BE49-F238E27FC236}">
+                <a16:creationId xmlns:a16="http://schemas.microsoft.com/office/drawing/2014/main" id="{9E67A204-FB90-4B26-B155-3FA8064AD2DF}"/>
+              </a:ext>
+              <a:ext uri="{C183D7F6-B498-43B3-948B-1728B52AA6E4}">
+                <adec:decorative xmlns:adec="http://schemas.microsoft.com/office/drawing/2017/decorative" val="1"/>
+              </a:ext>
+            </a:extLst>
+          </p:cNvPr>
+          <p:cNvSpPr>
+            <a:spLocks noGrp="1" noRot="1" noChangeAspect="1" noMove="1" noResize="1" noEditPoints="1" noAdjustHandles="1" noChangeArrowheads="1" noChangeShapeType="1" noTextEdit="1"/>
+          </p:cNvSpPr>
+          <p:nvPr>
+            <p:extLst>
+              <p:ext uri="{386F3935-93C4-4BCD-93E2-E3B085C9AB24}">
+                <p16:designElem xmlns:p16="http://schemas.microsoft.com/office/powerpoint/2015/main" val="1"/>
+              </p:ext>
+            </p:extLst>
+          </p:nvPr>
+        </p:nvSpPr>
+        <p:spPr>
+          <a:xfrm>
+            <a:off x="477012" y="480060"/>
+            <a:ext cx="11237976" cy="5897880"/>
+          </a:xfrm>
+          <a:prstGeom prst="rect">
+            <a:avLst/>
+          </a:prstGeom>
+          <a:solidFill>
+            <a:schemeClr val="bg1"/>
+          </a:solidFill>
+          <a:ln w="22225">
+            <a:solidFill>
+              <a:srgbClr val="C17F63"/>
+            </a:solidFill>
+          </a:ln>
+        </p:spPr>
+        <p:style>
+          <a:lnRef idx="2">
+            <a:schemeClr val="accent1">
+              <a:shade val="50000"/>
+            </a:schemeClr>
+          </a:lnRef>
+          <a:fillRef idx="1">
+            <a:schemeClr val="accent1"/>
+          </a:fillRef>
+          <a:effectRef idx="0">
+            <a:schemeClr val="accent1"/>
+          </a:effectRef>
+          <a:fontRef idx="minor">
+            <a:schemeClr val="lt1"/>
+          </a:fontRef>
+        </p:style>
+        <p:txBody>
+          <a:bodyPr rtlCol="0" anchor="ctr"/>
+          <a:lstStyle/>
+          <a:p>
+            <a:pPr algn="ctr"/>
+            <a:endParaRPr lang="en-US"/>
+          </a:p>
+        </p:txBody>
+      </p:sp>
+      <p:sp>
+        <p:nvSpPr>
+          <p:cNvPr id="2" name="Textfeld 1">
+            <a:extLst>
+              <a:ext uri="{FF2B5EF4-FFF2-40B4-BE49-F238E27FC236}">
                 <a16:creationId xmlns:a16="http://schemas.microsoft.com/office/drawing/2014/main" id="{C39C9EF2-E6A7-489D-B2CF-FE6C2DC73D3F}"/>
               </a:ext>
             </a:extLst>
@@ -5580,7 +6372,7 @@
 </p:sld>
 </file>
 
-<file path=ppt/slides/slide12.xml><?xml version="1.0" encoding="utf-8"?>
+<file path=ppt/slides/slide13.xml><?xml version="1.0" encoding="utf-8"?>
 <p:sld xmlns:a="http://schemas.openxmlformats.org/drawingml/2006/main" xmlns:r="http://schemas.openxmlformats.org/officeDocument/2006/relationships" xmlns:p="http://schemas.openxmlformats.org/presentationml/2006/main">
   <p:cSld>
     <p:bg>
@@ -6468,7 +7260,7 @@
 </p:sld>
 </file>
 
-<file path=ppt/slides/slide13.xml><?xml version="1.0" encoding="utf-8"?>
+<file path=ppt/slides/slide14.xml><?xml version="1.0" encoding="utf-8"?>
 <p:sld xmlns:a="http://schemas.openxmlformats.org/drawingml/2006/main" xmlns:r="http://schemas.openxmlformats.org/officeDocument/2006/relationships" xmlns:p="http://schemas.openxmlformats.org/presentationml/2006/main">
   <p:cSld>
     <p:bg>
@@ -9152,7 +9944,7 @@
 </p:sld>
 </file>
 
-<file path=ppt/slides/slide14.xml><?xml version="1.0" encoding="utf-8"?>
+<file path=ppt/slides/slide15.xml><?xml version="1.0" encoding="utf-8"?>
 <p:sld xmlns:a="http://schemas.openxmlformats.org/drawingml/2006/main" xmlns:r="http://schemas.openxmlformats.org/officeDocument/2006/relationships" xmlns:p="http://schemas.openxmlformats.org/presentationml/2006/main">
   <p:cSld>
     <p:bg>
@@ -9237,7 +10029,7 @@
           <a:graphicData uri="http://schemas.openxmlformats.org/presentationml/2006/ole">
             <mc:AlternateContent xmlns:mc="http://schemas.openxmlformats.org/markup-compatibility/2006">
               <mc:Choice xmlns:v="urn:schemas-microsoft-com:vml" Requires="v">
-                <p:oleObj spid="_x0000_s3088" name="Acrobat Document" r:id="rId3" imgW="4533723" imgH="6415677" progId="AcroExch.Document.DC">
+                <p:oleObj spid="_x0000_s3090" name="Acrobat Document" r:id="rId3" imgW="4533723" imgH="6415677" progId="AcroExch.Document.DC">
                   <p:embed/>
                 </p:oleObj>
               </mc:Choice>
@@ -9320,7 +10112,7 @@
 </p:sld>
 </file>
 
-<file path=ppt/slides/slide15.xml><?xml version="1.0" encoding="utf-8"?>
+<file path=ppt/slides/slide16.xml><?xml version="1.0" encoding="utf-8"?>
 <p:sld xmlns:a="http://schemas.openxmlformats.org/drawingml/2006/main" xmlns:r="http://schemas.openxmlformats.org/officeDocument/2006/relationships" xmlns:p="http://schemas.openxmlformats.org/presentationml/2006/main">
   <p:cSld>
     <p:bg>
@@ -9583,7 +10375,7 @@
 </p:sld>
 </file>
 
-<file path=ppt/slides/slide16.xml><?xml version="1.0" encoding="utf-8"?>
+<file path=ppt/slides/slide17.xml><?xml version="1.0" encoding="utf-8"?>
 <p:sld xmlns:a="http://schemas.openxmlformats.org/drawingml/2006/main" xmlns:r="http://schemas.openxmlformats.org/officeDocument/2006/relationships" xmlns:p="http://schemas.openxmlformats.org/presentationml/2006/main">
   <p:cSld>
     <p:bg>
@@ -9846,7 +10638,7 @@
 </p:sld>
 </file>
 
-<file path=ppt/slides/slide17.xml><?xml version="1.0" encoding="utf-8"?>
+<file path=ppt/slides/slide18.xml><?xml version="1.0" encoding="utf-8"?>
 <p:sld xmlns:a="http://schemas.openxmlformats.org/drawingml/2006/main" xmlns:r="http://schemas.openxmlformats.org/officeDocument/2006/relationships" xmlns:p="http://schemas.openxmlformats.org/presentationml/2006/main">
   <p:cSld>
     <p:bg>
@@ -10109,7 +10901,7 @@
 </p:sld>
 </file>
 
-<file path=ppt/slides/slide18.xml><?xml version="1.0" encoding="utf-8"?>
+<file path=ppt/slides/slide19.xml><?xml version="1.0" encoding="utf-8"?>
 <p:sld xmlns:a="http://schemas.openxmlformats.org/drawingml/2006/main" xmlns:r="http://schemas.openxmlformats.org/officeDocument/2006/relationships" xmlns:p="http://schemas.openxmlformats.org/presentationml/2006/main">
   <p:cSld>
     <p:bg>
@@ -10328,234 +11120,6 @@
     <p:extLst>
       <p:ext uri="{BB962C8B-B14F-4D97-AF65-F5344CB8AC3E}">
         <p14:creationId xmlns:p14="http://schemas.microsoft.com/office/powerpoint/2010/main" val="348029703"/>
-      </p:ext>
-    </p:extLst>
-  </p:cSld>
-  <p:clrMapOvr>
-    <a:masterClrMapping/>
-  </p:clrMapOvr>
-</p:sld>
-</file>
-
-<file path=ppt/slides/slide19.xml><?xml version="1.0" encoding="utf-8"?>
-<p:sld xmlns:a="http://schemas.openxmlformats.org/drawingml/2006/main" xmlns:r="http://schemas.openxmlformats.org/officeDocument/2006/relationships" xmlns:p="http://schemas.openxmlformats.org/presentationml/2006/main">
-  <p:cSld>
-    <p:bg>
-      <p:bgPr>
-        <a:solidFill>
-          <a:srgbClr val="4960A6"/>
-        </a:solidFill>
-        <a:effectLst/>
-      </p:bgPr>
-    </p:bg>
-    <p:spTree>
-      <p:nvGrpSpPr>
-        <p:cNvPr id="1" name=""/>
-        <p:cNvGrpSpPr/>
-        <p:nvPr/>
-      </p:nvGrpSpPr>
-      <p:grpSpPr>
-        <a:xfrm>
-          <a:off x="0" y="0"/>
-          <a:ext cx="0" cy="0"/>
-          <a:chOff x="0" y="0"/>
-          <a:chExt cx="0" cy="0"/>
-        </a:xfrm>
-      </p:grpSpPr>
-      <p:sp>
-        <p:nvSpPr>
-          <p:cNvPr id="22" name="Rectangle 21">
-            <a:extLst>
-              <a:ext uri="{FF2B5EF4-FFF2-40B4-BE49-F238E27FC236}">
-                <a16:creationId xmlns:a16="http://schemas.microsoft.com/office/drawing/2014/main" id="{44B3F5F5-166C-4694-B20A-3F8218AF7D03}"/>
-              </a:ext>
-              <a:ext uri="{C183D7F6-B498-43B3-948B-1728B52AA6E4}">
-                <adec:decorative xmlns:adec="http://schemas.microsoft.com/office/drawing/2017/decorative" val="1"/>
-              </a:ext>
-            </a:extLst>
-          </p:cNvPr>
-          <p:cNvSpPr>
-            <a:spLocks noGrp="1" noRot="1" noChangeAspect="1" noMove="1" noResize="1" noEditPoints="1" noAdjustHandles="1" noChangeArrowheads="1" noChangeShapeType="1" noTextEdit="1"/>
-          </p:cNvSpPr>
-          <p:nvPr>
-            <p:extLst>
-              <p:ext uri="{386F3935-93C4-4BCD-93E2-E3B085C9AB24}">
-                <p16:designElem xmlns:p16="http://schemas.microsoft.com/office/powerpoint/2015/main" val="1"/>
-              </p:ext>
-            </p:extLst>
-          </p:nvPr>
-        </p:nvSpPr>
-        <p:spPr>
-          <a:xfrm>
-            <a:off x="0" y="0"/>
-            <a:ext cx="12192000" cy="6858000"/>
-          </a:xfrm>
-          <a:prstGeom prst="rect">
-            <a:avLst/>
-          </a:prstGeom>
-          <a:solidFill>
-            <a:schemeClr val="bg2"/>
-          </a:solidFill>
-          <a:ln>
-            <a:noFill/>
-          </a:ln>
-        </p:spPr>
-        <p:style>
-          <a:lnRef idx="2">
-            <a:schemeClr val="accent1">
-              <a:shade val="50000"/>
-            </a:schemeClr>
-          </a:lnRef>
-          <a:fillRef idx="1">
-            <a:schemeClr val="accent1"/>
-          </a:fillRef>
-          <a:effectRef idx="0">
-            <a:schemeClr val="accent1"/>
-          </a:effectRef>
-          <a:fontRef idx="minor">
-            <a:schemeClr val="lt1"/>
-          </a:fontRef>
-        </p:style>
-        <p:txBody>
-          <a:bodyPr rtlCol="0" anchor="ctr"/>
-          <a:lstStyle/>
-          <a:p>
-            <a:pPr algn="ctr"/>
-            <a:endParaRPr lang="en-US"/>
-          </a:p>
-        </p:txBody>
-      </p:sp>
-      <p:sp>
-        <p:nvSpPr>
-          <p:cNvPr id="24" name="Rectangle 23">
-            <a:extLst>
-              <a:ext uri="{FF2B5EF4-FFF2-40B4-BE49-F238E27FC236}">
-                <a16:creationId xmlns:a16="http://schemas.microsoft.com/office/drawing/2014/main" id="{9E67A204-FB90-4B26-B155-3FA8064AD2DF}"/>
-              </a:ext>
-              <a:ext uri="{C183D7F6-B498-43B3-948B-1728B52AA6E4}">
-                <adec:decorative xmlns:adec="http://schemas.microsoft.com/office/drawing/2017/decorative" val="1"/>
-              </a:ext>
-            </a:extLst>
-          </p:cNvPr>
-          <p:cNvSpPr>
-            <a:spLocks noGrp="1" noRot="1" noChangeAspect="1" noMove="1" noResize="1" noEditPoints="1" noAdjustHandles="1" noChangeArrowheads="1" noChangeShapeType="1" noTextEdit="1"/>
-          </p:cNvSpPr>
-          <p:nvPr>
-            <p:extLst>
-              <p:ext uri="{386F3935-93C4-4BCD-93E2-E3B085C9AB24}">
-                <p16:designElem xmlns:p16="http://schemas.microsoft.com/office/powerpoint/2015/main" val="1"/>
-              </p:ext>
-            </p:extLst>
-          </p:nvPr>
-        </p:nvSpPr>
-        <p:spPr>
-          <a:xfrm>
-            <a:off x="477012" y="480060"/>
-            <a:ext cx="11237976" cy="5897880"/>
-          </a:xfrm>
-          <a:prstGeom prst="rect">
-            <a:avLst/>
-          </a:prstGeom>
-          <a:solidFill>
-            <a:schemeClr val="bg1"/>
-          </a:solidFill>
-          <a:ln w="22225">
-            <a:solidFill>
-              <a:srgbClr val="C17F63"/>
-            </a:solidFill>
-          </a:ln>
-        </p:spPr>
-        <p:style>
-          <a:lnRef idx="2">
-            <a:schemeClr val="accent1">
-              <a:shade val="50000"/>
-            </a:schemeClr>
-          </a:lnRef>
-          <a:fillRef idx="1">
-            <a:schemeClr val="accent1"/>
-          </a:fillRef>
-          <a:effectRef idx="0">
-            <a:schemeClr val="accent1"/>
-          </a:effectRef>
-          <a:fontRef idx="minor">
-            <a:schemeClr val="lt1"/>
-          </a:fontRef>
-        </p:style>
-        <p:txBody>
-          <a:bodyPr rtlCol="0" anchor="ctr"/>
-          <a:lstStyle/>
-          <a:p>
-            <a:pPr algn="ctr"/>
-            <a:endParaRPr lang="en-US"/>
-          </a:p>
-        </p:txBody>
-      </p:sp>
-      <p:sp>
-        <p:nvSpPr>
-          <p:cNvPr id="2" name="Textfeld 1">
-            <a:extLst>
-              <a:ext uri="{FF2B5EF4-FFF2-40B4-BE49-F238E27FC236}">
-                <a16:creationId xmlns:a16="http://schemas.microsoft.com/office/drawing/2014/main" id="{91CF4895-9E43-4451-AD30-62BB9C62C0DB}"/>
-              </a:ext>
-            </a:extLst>
-          </p:cNvPr>
-          <p:cNvSpPr txBox="1"/>
-          <p:nvPr/>
-        </p:nvSpPr>
-        <p:spPr>
-          <a:xfrm>
-            <a:off x="685800" y="795528"/>
-            <a:ext cx="184731" cy="369332"/>
-          </a:xfrm>
-          <a:prstGeom prst="rect">
-            <a:avLst/>
-          </a:prstGeom>
-          <a:noFill/>
-        </p:spPr>
-        <p:txBody>
-          <a:bodyPr wrap="none" rtlCol="0">
-            <a:spAutoFit/>
-          </a:bodyPr>
-          <a:lstStyle/>
-          <a:p>
-            <a:endParaRPr lang="de-DE" dirty="0"/>
-          </a:p>
-        </p:txBody>
-      </p:sp>
-      <p:pic>
-        <p:nvPicPr>
-          <p:cNvPr id="3" name="Grafik 2">
-            <a:extLst>
-              <a:ext uri="{FF2B5EF4-FFF2-40B4-BE49-F238E27FC236}">
-                <a16:creationId xmlns:a16="http://schemas.microsoft.com/office/drawing/2014/main" id="{E691BE55-BF9B-45C3-8197-BB12E04BACF4}"/>
-              </a:ext>
-            </a:extLst>
-          </p:cNvPr>
-          <p:cNvPicPr>
-            <a:picLocks noChangeAspect="1"/>
-          </p:cNvPicPr>
-          <p:nvPr/>
-        </p:nvPicPr>
-        <p:blipFill>
-          <a:blip r:embed="rId2"/>
-          <a:stretch>
-            <a:fillRect/>
-          </a:stretch>
-        </p:blipFill>
-        <p:spPr>
-          <a:xfrm>
-            <a:off x="561975" y="1028700"/>
-            <a:ext cx="11068050" cy="4800600"/>
-          </a:xfrm>
-          <a:prstGeom prst="rect">
-            <a:avLst/>
-          </a:prstGeom>
-        </p:spPr>
-      </p:pic>
-    </p:spTree>
-    <p:extLst>
-      <p:ext uri="{BB962C8B-B14F-4D97-AF65-F5344CB8AC3E}">
-        <p14:creationId xmlns:p14="http://schemas.microsoft.com/office/powerpoint/2010/main" val="1153213044"/>
       </p:ext>
     </p:extLst>
   </p:cSld>
@@ -11058,6 +11622,234 @@
           </a:p>
         </p:txBody>
       </p:sp>
+      <p:pic>
+        <p:nvPicPr>
+          <p:cNvPr id="3" name="Grafik 2">
+            <a:extLst>
+              <a:ext uri="{FF2B5EF4-FFF2-40B4-BE49-F238E27FC236}">
+                <a16:creationId xmlns:a16="http://schemas.microsoft.com/office/drawing/2014/main" id="{E691BE55-BF9B-45C3-8197-BB12E04BACF4}"/>
+              </a:ext>
+            </a:extLst>
+          </p:cNvPr>
+          <p:cNvPicPr>
+            <a:picLocks noChangeAspect="1"/>
+          </p:cNvPicPr>
+          <p:nvPr/>
+        </p:nvPicPr>
+        <p:blipFill>
+          <a:blip r:embed="rId2"/>
+          <a:stretch>
+            <a:fillRect/>
+          </a:stretch>
+        </p:blipFill>
+        <p:spPr>
+          <a:xfrm>
+            <a:off x="561975" y="1028700"/>
+            <a:ext cx="11068050" cy="4800600"/>
+          </a:xfrm>
+          <a:prstGeom prst="rect">
+            <a:avLst/>
+          </a:prstGeom>
+        </p:spPr>
+      </p:pic>
+    </p:spTree>
+    <p:extLst>
+      <p:ext uri="{BB962C8B-B14F-4D97-AF65-F5344CB8AC3E}">
+        <p14:creationId xmlns:p14="http://schemas.microsoft.com/office/powerpoint/2010/main" val="1153213044"/>
+      </p:ext>
+    </p:extLst>
+  </p:cSld>
+  <p:clrMapOvr>
+    <a:masterClrMapping/>
+  </p:clrMapOvr>
+</p:sld>
+</file>
+
+<file path=ppt/slides/slide21.xml><?xml version="1.0" encoding="utf-8"?>
+<p:sld xmlns:a="http://schemas.openxmlformats.org/drawingml/2006/main" xmlns:r="http://schemas.openxmlformats.org/officeDocument/2006/relationships" xmlns:p="http://schemas.openxmlformats.org/presentationml/2006/main" show="0">
+  <p:cSld>
+    <p:bg>
+      <p:bgPr>
+        <a:solidFill>
+          <a:srgbClr val="4960A6"/>
+        </a:solidFill>
+        <a:effectLst/>
+      </p:bgPr>
+    </p:bg>
+    <p:spTree>
+      <p:nvGrpSpPr>
+        <p:cNvPr id="1" name=""/>
+        <p:cNvGrpSpPr/>
+        <p:nvPr/>
+      </p:nvGrpSpPr>
+      <p:grpSpPr>
+        <a:xfrm>
+          <a:off x="0" y="0"/>
+          <a:ext cx="0" cy="0"/>
+          <a:chOff x="0" y="0"/>
+          <a:chExt cx="0" cy="0"/>
+        </a:xfrm>
+      </p:grpSpPr>
+      <p:sp>
+        <p:nvSpPr>
+          <p:cNvPr id="22" name="Rectangle 21">
+            <a:extLst>
+              <a:ext uri="{FF2B5EF4-FFF2-40B4-BE49-F238E27FC236}">
+                <a16:creationId xmlns:a16="http://schemas.microsoft.com/office/drawing/2014/main" id="{44B3F5F5-166C-4694-B20A-3F8218AF7D03}"/>
+              </a:ext>
+              <a:ext uri="{C183D7F6-B498-43B3-948B-1728B52AA6E4}">
+                <adec:decorative xmlns:adec="http://schemas.microsoft.com/office/drawing/2017/decorative" val="1"/>
+              </a:ext>
+            </a:extLst>
+          </p:cNvPr>
+          <p:cNvSpPr>
+            <a:spLocks noGrp="1" noRot="1" noChangeAspect="1" noMove="1" noResize="1" noEditPoints="1" noAdjustHandles="1" noChangeArrowheads="1" noChangeShapeType="1" noTextEdit="1"/>
+          </p:cNvSpPr>
+          <p:nvPr>
+            <p:extLst>
+              <p:ext uri="{386F3935-93C4-4BCD-93E2-E3B085C9AB24}">
+                <p16:designElem xmlns:p16="http://schemas.microsoft.com/office/powerpoint/2015/main" val="1"/>
+              </p:ext>
+            </p:extLst>
+          </p:nvPr>
+        </p:nvSpPr>
+        <p:spPr>
+          <a:xfrm>
+            <a:off x="0" y="0"/>
+            <a:ext cx="12192000" cy="6858000"/>
+          </a:xfrm>
+          <a:prstGeom prst="rect">
+            <a:avLst/>
+          </a:prstGeom>
+          <a:solidFill>
+            <a:schemeClr val="bg2"/>
+          </a:solidFill>
+          <a:ln>
+            <a:noFill/>
+          </a:ln>
+        </p:spPr>
+        <p:style>
+          <a:lnRef idx="2">
+            <a:schemeClr val="accent1">
+              <a:shade val="50000"/>
+            </a:schemeClr>
+          </a:lnRef>
+          <a:fillRef idx="1">
+            <a:schemeClr val="accent1"/>
+          </a:fillRef>
+          <a:effectRef idx="0">
+            <a:schemeClr val="accent1"/>
+          </a:effectRef>
+          <a:fontRef idx="minor">
+            <a:schemeClr val="lt1"/>
+          </a:fontRef>
+        </p:style>
+        <p:txBody>
+          <a:bodyPr rtlCol="0" anchor="ctr"/>
+          <a:lstStyle/>
+          <a:p>
+            <a:pPr algn="ctr"/>
+            <a:endParaRPr lang="en-US"/>
+          </a:p>
+        </p:txBody>
+      </p:sp>
+      <p:sp>
+        <p:nvSpPr>
+          <p:cNvPr id="24" name="Rectangle 23">
+            <a:extLst>
+              <a:ext uri="{FF2B5EF4-FFF2-40B4-BE49-F238E27FC236}">
+                <a16:creationId xmlns:a16="http://schemas.microsoft.com/office/drawing/2014/main" id="{9E67A204-FB90-4B26-B155-3FA8064AD2DF}"/>
+              </a:ext>
+              <a:ext uri="{C183D7F6-B498-43B3-948B-1728B52AA6E4}">
+                <adec:decorative xmlns:adec="http://schemas.microsoft.com/office/drawing/2017/decorative" val="1"/>
+              </a:ext>
+            </a:extLst>
+          </p:cNvPr>
+          <p:cNvSpPr>
+            <a:spLocks noGrp="1" noRot="1" noChangeAspect="1" noMove="1" noResize="1" noEditPoints="1" noAdjustHandles="1" noChangeArrowheads="1" noChangeShapeType="1" noTextEdit="1"/>
+          </p:cNvSpPr>
+          <p:nvPr>
+            <p:extLst>
+              <p:ext uri="{386F3935-93C4-4BCD-93E2-E3B085C9AB24}">
+                <p16:designElem xmlns:p16="http://schemas.microsoft.com/office/powerpoint/2015/main" val="1"/>
+              </p:ext>
+            </p:extLst>
+          </p:nvPr>
+        </p:nvSpPr>
+        <p:spPr>
+          <a:xfrm>
+            <a:off x="477012" y="480060"/>
+            <a:ext cx="11237976" cy="5897880"/>
+          </a:xfrm>
+          <a:prstGeom prst="rect">
+            <a:avLst/>
+          </a:prstGeom>
+          <a:solidFill>
+            <a:schemeClr val="bg1"/>
+          </a:solidFill>
+          <a:ln w="22225">
+            <a:solidFill>
+              <a:srgbClr val="C17F63"/>
+            </a:solidFill>
+          </a:ln>
+        </p:spPr>
+        <p:style>
+          <a:lnRef idx="2">
+            <a:schemeClr val="accent1">
+              <a:shade val="50000"/>
+            </a:schemeClr>
+          </a:lnRef>
+          <a:fillRef idx="1">
+            <a:schemeClr val="accent1"/>
+          </a:fillRef>
+          <a:effectRef idx="0">
+            <a:schemeClr val="accent1"/>
+          </a:effectRef>
+          <a:fontRef idx="minor">
+            <a:schemeClr val="lt1"/>
+          </a:fontRef>
+        </p:style>
+        <p:txBody>
+          <a:bodyPr rtlCol="0" anchor="ctr"/>
+          <a:lstStyle/>
+          <a:p>
+            <a:pPr algn="ctr"/>
+            <a:endParaRPr lang="en-US"/>
+          </a:p>
+        </p:txBody>
+      </p:sp>
+      <p:sp>
+        <p:nvSpPr>
+          <p:cNvPr id="2" name="Textfeld 1">
+            <a:extLst>
+              <a:ext uri="{FF2B5EF4-FFF2-40B4-BE49-F238E27FC236}">
+                <a16:creationId xmlns:a16="http://schemas.microsoft.com/office/drawing/2014/main" id="{91CF4895-9E43-4451-AD30-62BB9C62C0DB}"/>
+              </a:ext>
+            </a:extLst>
+          </p:cNvPr>
+          <p:cNvSpPr txBox="1"/>
+          <p:nvPr/>
+        </p:nvSpPr>
+        <p:spPr>
+          <a:xfrm>
+            <a:off x="685800" y="795528"/>
+            <a:ext cx="184731" cy="369332"/>
+          </a:xfrm>
+          <a:prstGeom prst="rect">
+            <a:avLst/>
+          </a:prstGeom>
+          <a:noFill/>
+        </p:spPr>
+        <p:txBody>
+          <a:bodyPr wrap="none" rtlCol="0">
+            <a:spAutoFit/>
+          </a:bodyPr>
+          <a:lstStyle/>
+          <a:p>
+            <a:endParaRPr lang="de-DE" dirty="0"/>
+          </a:p>
+        </p:txBody>
+      </p:sp>
     </p:spTree>
     <p:extLst>
       <p:ext uri="{BB962C8B-B14F-4D97-AF65-F5344CB8AC3E}">
@@ -11071,7 +11863,7 @@
 </p:sld>
 </file>
 
-<file path=ppt/slides/slide21.xml><?xml version="1.0" encoding="utf-8"?>
+<file path=ppt/slides/slide22.xml><?xml version="1.0" encoding="utf-8"?>
 <p:sld xmlns:a="http://schemas.openxmlformats.org/drawingml/2006/main" xmlns:r="http://schemas.openxmlformats.org/officeDocument/2006/relationships" xmlns:p="http://schemas.openxmlformats.org/presentationml/2006/main">
   <p:cSld>
     <p:bg>

</xml_diff>